<commit_message>
modification word et css
</commit_message>
<xml_diff>
--- a/doc/ppt_gameshark.pptx
+++ b/doc/ppt_gameshark.pptx
@@ -144,6 +144,11 @@
       </a:defRPr>
     </a:lvl9pPr>
   </p:defaultTextStyle>
+  <p:extLst>
+    <p:ext uri="{EFAFB233-063F-42B5-8137-9DF3F51BA10A}">
+      <p15:sldGuideLst xmlns:p15="http://schemas.microsoft.com/office/powerpoint/2012/main"/>
+    </p:ext>
+  </p:extLst>
 </p:presentation>
 </file>
 
@@ -204,7 +209,7 @@
           <a:noFill/>
           <a:extLst>
             <a:ext uri="{909E8E84-426E-40dd-AFC4-6F175D3DCCD1}">
-              <a14:hiddenFill xmlns:a14="http://schemas.microsoft.com/office/drawing/2010/main" xmlns="">
+              <a14:hiddenFill xmlns="" xmlns:a14="http://schemas.microsoft.com/office/drawing/2010/main">
                 <a:solidFill>
                   <a:srgbClr val="FFFFFF"/>
                 </a:solidFill>
@@ -263,7 +268,7 @@
             </a:ln>
             <a:extLst>
               <a:ext uri="{91240B29-F687-4f45-9708-019B960494DF}">
-                <a14:hiddenLine xmlns:a14="http://schemas.microsoft.com/office/drawing/2010/main" xmlns="" w="9525">
+                <a14:hiddenLine xmlns="" xmlns:a14="http://schemas.microsoft.com/office/drawing/2010/main" w="9525">
                   <a:solidFill>
                     <a:srgbClr val="000000"/>
                   </a:solidFill>
@@ -353,7 +358,7 @@
             </a:ln>
             <a:extLst>
               <a:ext uri="{91240B29-F687-4f45-9708-019B960494DF}">
-                <a14:hiddenLine xmlns:a14="http://schemas.microsoft.com/office/drawing/2010/main" xmlns="" w="9525">
+                <a14:hiddenLine xmlns="" xmlns:a14="http://schemas.microsoft.com/office/drawing/2010/main" w="9525">
                   <a:solidFill>
                     <a:srgbClr val="000000"/>
                   </a:solidFill>
@@ -443,7 +448,7 @@
             </a:ln>
             <a:extLst>
               <a:ext uri="{91240B29-F687-4f45-9708-019B960494DF}">
-                <a14:hiddenLine xmlns:a14="http://schemas.microsoft.com/office/drawing/2010/main" xmlns="" w="9525">
+                <a14:hiddenLine xmlns="" xmlns:a14="http://schemas.microsoft.com/office/drawing/2010/main" w="9525">
                   <a:solidFill>
                     <a:srgbClr val="000000"/>
                   </a:solidFill>
@@ -477,7 +482,7 @@
             </a:ln>
             <a:extLst>
               <a:ext uri="{91240B29-F687-4f45-9708-019B960494DF}">
-                <a14:hiddenLine xmlns:a14="http://schemas.microsoft.com/office/drawing/2010/main" xmlns="" w="9525">
+                <a14:hiddenLine xmlns="" xmlns:a14="http://schemas.microsoft.com/office/drawing/2010/main" w="9525">
                   <a:solidFill>
                     <a:srgbClr val="000000"/>
                   </a:solidFill>
@@ -567,7 +572,7 @@
             </a:ln>
             <a:extLst>
               <a:ext uri="{91240B29-F687-4f45-9708-019B960494DF}">
-                <a14:hiddenLine xmlns:a14="http://schemas.microsoft.com/office/drawing/2010/main" xmlns="" w="9525">
+                <a14:hiddenLine xmlns="" xmlns:a14="http://schemas.microsoft.com/office/drawing/2010/main" w="9525">
                   <a:solidFill>
                     <a:srgbClr val="000000"/>
                   </a:solidFill>
@@ -629,7 +634,7 @@
             </a:ln>
             <a:extLst>
               <a:ext uri="{91240B29-F687-4f45-9708-019B960494DF}">
-                <a14:hiddenLine xmlns:a14="http://schemas.microsoft.com/office/drawing/2010/main" xmlns="" w="9525">
+                <a14:hiddenLine xmlns="" xmlns:a14="http://schemas.microsoft.com/office/drawing/2010/main" w="9525">
                   <a:solidFill>
                     <a:srgbClr val="000000"/>
                   </a:solidFill>
@@ -691,7 +696,7 @@
             </a:ln>
             <a:extLst>
               <a:ext uri="{91240B29-F687-4f45-9708-019B960494DF}">
-                <a14:hiddenLine xmlns:a14="http://schemas.microsoft.com/office/drawing/2010/main" xmlns="" w="9525">
+                <a14:hiddenLine xmlns="" xmlns:a14="http://schemas.microsoft.com/office/drawing/2010/main" w="9525">
                   <a:solidFill>
                     <a:srgbClr val="000000"/>
                   </a:solidFill>
@@ -781,7 +786,7 @@
             </a:ln>
             <a:extLst>
               <a:ext uri="{91240B29-F687-4f45-9708-019B960494DF}">
-                <a14:hiddenLine xmlns:a14="http://schemas.microsoft.com/office/drawing/2010/main" xmlns="" w="9525">
+                <a14:hiddenLine xmlns="" xmlns:a14="http://schemas.microsoft.com/office/drawing/2010/main" w="9525">
                   <a:solidFill>
                     <a:srgbClr val="000000"/>
                   </a:solidFill>
@@ -843,7 +848,7 @@
             </a:ln>
             <a:extLst>
               <a:ext uri="{91240B29-F687-4f45-9708-019B960494DF}">
-                <a14:hiddenLine xmlns:a14="http://schemas.microsoft.com/office/drawing/2010/main" xmlns="" w="9525">
+                <a14:hiddenLine xmlns="" xmlns:a14="http://schemas.microsoft.com/office/drawing/2010/main" w="9525">
                   <a:solidFill>
                     <a:srgbClr val="000000"/>
                   </a:solidFill>
@@ -905,7 +910,7 @@
             </a:ln>
             <a:extLst>
               <a:ext uri="{91240B29-F687-4f45-9708-019B960494DF}">
-                <a14:hiddenLine xmlns:a14="http://schemas.microsoft.com/office/drawing/2010/main" xmlns="" w="9525">
+                <a14:hiddenLine xmlns="" xmlns:a14="http://schemas.microsoft.com/office/drawing/2010/main" w="9525">
                   <a:solidFill>
                     <a:srgbClr val="000000"/>
                   </a:solidFill>
@@ -995,7 +1000,7 @@
             </a:ln>
             <a:extLst>
               <a:ext uri="{91240B29-F687-4f45-9708-019B960494DF}">
-                <a14:hiddenLine xmlns:a14="http://schemas.microsoft.com/office/drawing/2010/main" xmlns="" w="9525">
+                <a14:hiddenLine xmlns="" xmlns:a14="http://schemas.microsoft.com/office/drawing/2010/main" w="9525">
                   <a:solidFill>
                     <a:srgbClr val="000000"/>
                   </a:solidFill>
@@ -1085,7 +1090,7 @@
             </a:ln>
             <a:extLst>
               <a:ext uri="{91240B29-F687-4f45-9708-019B960494DF}">
-                <a14:hiddenLine xmlns:a14="http://schemas.microsoft.com/office/drawing/2010/main" xmlns="" w="9525">
+                <a14:hiddenLine xmlns="" xmlns:a14="http://schemas.microsoft.com/office/drawing/2010/main" w="9525">
                   <a:solidFill>
                     <a:srgbClr val="000000"/>
                   </a:solidFill>
@@ -1147,7 +1152,7 @@
             </a:ln>
             <a:extLst>
               <a:ext uri="{91240B29-F687-4f45-9708-019B960494DF}">
-                <a14:hiddenLine xmlns:a14="http://schemas.microsoft.com/office/drawing/2010/main" xmlns="" w="9525">
+                <a14:hiddenLine xmlns="" xmlns:a14="http://schemas.microsoft.com/office/drawing/2010/main" w="9525">
                   <a:solidFill>
                     <a:srgbClr val="000000"/>
                   </a:solidFill>
@@ -1257,7 +1262,7 @@
             </a:ln>
             <a:extLst>
               <a:ext uri="{91240B29-F687-4f45-9708-019B960494DF}">
-                <a14:hiddenLine xmlns:a14="http://schemas.microsoft.com/office/drawing/2010/main" xmlns="" w="9525">
+                <a14:hiddenLine xmlns="" xmlns:a14="http://schemas.microsoft.com/office/drawing/2010/main" w="9525">
                   <a:solidFill>
                     <a:srgbClr val="000000"/>
                   </a:solidFill>
@@ -1319,7 +1324,7 @@
             </a:ln>
             <a:extLst>
               <a:ext uri="{91240B29-F687-4f45-9708-019B960494DF}">
-                <a14:hiddenLine xmlns:a14="http://schemas.microsoft.com/office/drawing/2010/main" xmlns="" w="9525">
+                <a14:hiddenLine xmlns="" xmlns:a14="http://schemas.microsoft.com/office/drawing/2010/main" w="9525">
                   <a:solidFill>
                     <a:srgbClr val="000000"/>
                   </a:solidFill>
@@ -1409,7 +1414,7 @@
             </a:ln>
             <a:extLst>
               <a:ext uri="{91240B29-F687-4f45-9708-019B960494DF}">
-                <a14:hiddenLine xmlns:a14="http://schemas.microsoft.com/office/drawing/2010/main" xmlns="" w="9525">
+                <a14:hiddenLine xmlns="" xmlns:a14="http://schemas.microsoft.com/office/drawing/2010/main" w="9525">
                   <a:solidFill>
                     <a:srgbClr val="000000"/>
                   </a:solidFill>
@@ -1499,7 +1504,7 @@
             </a:ln>
             <a:extLst>
               <a:ext uri="{91240B29-F687-4f45-9708-019B960494DF}">
-                <a14:hiddenLine xmlns:a14="http://schemas.microsoft.com/office/drawing/2010/main" xmlns="" w="9525">
+                <a14:hiddenLine xmlns="" xmlns:a14="http://schemas.microsoft.com/office/drawing/2010/main" w="9525">
                   <a:solidFill>
                     <a:srgbClr val="000000"/>
                   </a:solidFill>
@@ -1561,7 +1566,7 @@
             </a:ln>
             <a:extLst>
               <a:ext uri="{91240B29-F687-4f45-9708-019B960494DF}">
-                <a14:hiddenLine xmlns:a14="http://schemas.microsoft.com/office/drawing/2010/main" xmlns="" w="9525">
+                <a14:hiddenLine xmlns="" xmlns:a14="http://schemas.microsoft.com/office/drawing/2010/main" w="9525">
                   <a:solidFill>
                     <a:srgbClr val="000000"/>
                   </a:solidFill>
@@ -1651,7 +1656,7 @@
             </a:ln>
             <a:extLst>
               <a:ext uri="{91240B29-F687-4f45-9708-019B960494DF}">
-                <a14:hiddenLine xmlns:a14="http://schemas.microsoft.com/office/drawing/2010/main" xmlns="" w="9525">
+                <a14:hiddenLine xmlns="" xmlns:a14="http://schemas.microsoft.com/office/drawing/2010/main" w="9525">
                   <a:solidFill>
                     <a:srgbClr val="000000"/>
                   </a:solidFill>
@@ -1741,7 +1746,7 @@
             </a:ln>
             <a:extLst>
               <a:ext uri="{91240B29-F687-4f45-9708-019B960494DF}">
-                <a14:hiddenLine xmlns:a14="http://schemas.microsoft.com/office/drawing/2010/main" xmlns="" w="9525">
+                <a14:hiddenLine xmlns="" xmlns:a14="http://schemas.microsoft.com/office/drawing/2010/main" w="9525">
                   <a:solidFill>
                     <a:srgbClr val="000000"/>
                   </a:solidFill>
@@ -1797,7 +1802,7 @@
             </a:ln>
             <a:extLst>
               <a:ext uri="{91240B29-F687-4f45-9708-019B960494DF}">
-                <a14:hiddenLine xmlns:a14="http://schemas.microsoft.com/office/drawing/2010/main" xmlns="" w="9525">
+                <a14:hiddenLine xmlns="" xmlns:a14="http://schemas.microsoft.com/office/drawing/2010/main" w="9525">
                   <a:solidFill>
                     <a:srgbClr val="000000"/>
                   </a:solidFill>
@@ -1887,7 +1892,7 @@
             </a:ln>
             <a:extLst>
               <a:ext uri="{91240B29-F687-4f45-9708-019B960494DF}">
-                <a14:hiddenLine xmlns:a14="http://schemas.microsoft.com/office/drawing/2010/main" xmlns="" w="9525">
+                <a14:hiddenLine xmlns="" xmlns:a14="http://schemas.microsoft.com/office/drawing/2010/main" w="9525">
                   <a:solidFill>
                     <a:srgbClr val="000000"/>
                   </a:solidFill>
@@ -1943,7 +1948,7 @@
             </a:ln>
             <a:extLst>
               <a:ext uri="{91240B29-F687-4f45-9708-019B960494DF}">
-                <a14:hiddenLine xmlns:a14="http://schemas.microsoft.com/office/drawing/2010/main" xmlns="" w="9525">
+                <a14:hiddenLine xmlns="" xmlns:a14="http://schemas.microsoft.com/office/drawing/2010/main" w="9525">
                   <a:solidFill>
                     <a:srgbClr val="000000"/>
                   </a:solidFill>
@@ -2033,7 +2038,7 @@
             </a:ln>
             <a:extLst>
               <a:ext uri="{91240B29-F687-4f45-9708-019B960494DF}">
-                <a14:hiddenLine xmlns:a14="http://schemas.microsoft.com/office/drawing/2010/main" xmlns="" w="9525">
+                <a14:hiddenLine xmlns="" xmlns:a14="http://schemas.microsoft.com/office/drawing/2010/main" w="9525">
                   <a:solidFill>
                     <a:srgbClr val="000000"/>
                   </a:solidFill>
@@ -2101,7 +2106,7 @@
             </a:ln>
             <a:extLst>
               <a:ext uri="{91240B29-F687-4f45-9708-019B960494DF}">
-                <a14:hiddenLine xmlns:a14="http://schemas.microsoft.com/office/drawing/2010/main" xmlns="" w="9525">
+                <a14:hiddenLine xmlns="" xmlns:a14="http://schemas.microsoft.com/office/drawing/2010/main" w="9525">
                   <a:solidFill>
                     <a:srgbClr val="000000"/>
                   </a:solidFill>
@@ -2191,7 +2196,7 @@
             </a:ln>
             <a:extLst>
               <a:ext uri="{91240B29-F687-4f45-9708-019B960494DF}">
-                <a14:hiddenLine xmlns:a14="http://schemas.microsoft.com/office/drawing/2010/main" xmlns="" w="9525">
+                <a14:hiddenLine xmlns="" xmlns:a14="http://schemas.microsoft.com/office/drawing/2010/main" w="9525">
                   <a:solidFill>
                     <a:srgbClr val="000000"/>
                   </a:solidFill>
@@ -2259,7 +2264,7 @@
             </a:ln>
             <a:extLst>
               <a:ext uri="{91240B29-F687-4f45-9708-019B960494DF}">
-                <a14:hiddenLine xmlns:a14="http://schemas.microsoft.com/office/drawing/2010/main" xmlns="" w="9525">
+                <a14:hiddenLine xmlns="" xmlns:a14="http://schemas.microsoft.com/office/drawing/2010/main" w="9525">
                   <a:solidFill>
                     <a:srgbClr val="000000"/>
                   </a:solidFill>
@@ -2349,7 +2354,7 @@
             </a:ln>
             <a:extLst>
               <a:ext uri="{91240B29-F687-4f45-9708-019B960494DF}">
-                <a14:hiddenLine xmlns:a14="http://schemas.microsoft.com/office/drawing/2010/main" xmlns="" w="9525">
+                <a14:hiddenLine xmlns="" xmlns:a14="http://schemas.microsoft.com/office/drawing/2010/main" w="9525">
                   <a:solidFill>
                     <a:srgbClr val="000000"/>
                   </a:solidFill>
@@ -2383,7 +2388,7 @@
             </a:ln>
             <a:extLst>
               <a:ext uri="{91240B29-F687-4f45-9708-019B960494DF}">
-                <a14:hiddenLine xmlns:a14="http://schemas.microsoft.com/office/drawing/2010/main" xmlns="" w="9525">
+                <a14:hiddenLine xmlns="" xmlns:a14="http://schemas.microsoft.com/office/drawing/2010/main" w="9525">
                   <a:solidFill>
                     <a:srgbClr val="000000"/>
                   </a:solidFill>
@@ -2473,7 +2478,7 @@
             </a:ln>
             <a:extLst>
               <a:ext uri="{91240B29-F687-4f45-9708-019B960494DF}">
-                <a14:hiddenLine xmlns:a14="http://schemas.microsoft.com/office/drawing/2010/main" xmlns="" w="9525">
+                <a14:hiddenLine xmlns="" xmlns:a14="http://schemas.microsoft.com/office/drawing/2010/main" w="9525">
                   <a:solidFill>
                     <a:srgbClr val="000000"/>
                   </a:solidFill>
@@ -2535,7 +2540,7 @@
             </a:ln>
             <a:extLst>
               <a:ext uri="{91240B29-F687-4f45-9708-019B960494DF}">
-                <a14:hiddenLine xmlns:a14="http://schemas.microsoft.com/office/drawing/2010/main" xmlns="" w="9525">
+                <a14:hiddenLine xmlns="" xmlns:a14="http://schemas.microsoft.com/office/drawing/2010/main" w="9525">
                   <a:solidFill>
                     <a:srgbClr val="000000"/>
                   </a:solidFill>
@@ -2597,7 +2602,7 @@
             </a:ln>
             <a:extLst>
               <a:ext uri="{91240B29-F687-4f45-9708-019B960494DF}">
-                <a14:hiddenLine xmlns:a14="http://schemas.microsoft.com/office/drawing/2010/main" xmlns="" w="9525">
+                <a14:hiddenLine xmlns="" xmlns:a14="http://schemas.microsoft.com/office/drawing/2010/main" w="9525">
                   <a:solidFill>
                     <a:srgbClr val="000000"/>
                   </a:solidFill>
@@ -2687,7 +2692,7 @@
             </a:ln>
             <a:extLst>
               <a:ext uri="{91240B29-F687-4f45-9708-019B960494DF}">
-                <a14:hiddenLine xmlns:a14="http://schemas.microsoft.com/office/drawing/2010/main" xmlns="" w="9525">
+                <a14:hiddenLine xmlns="" xmlns:a14="http://schemas.microsoft.com/office/drawing/2010/main" w="9525">
                   <a:solidFill>
                     <a:srgbClr val="000000"/>
                   </a:solidFill>
@@ -2755,7 +2760,7 @@
             </a:ln>
             <a:extLst>
               <a:ext uri="{91240B29-F687-4f45-9708-019B960494DF}">
-                <a14:hiddenLine xmlns:a14="http://schemas.microsoft.com/office/drawing/2010/main" xmlns="" w="9525">
+                <a14:hiddenLine xmlns="" xmlns:a14="http://schemas.microsoft.com/office/drawing/2010/main" w="9525">
                   <a:solidFill>
                     <a:srgbClr val="000000"/>
                   </a:solidFill>
@@ -2817,7 +2822,7 @@
             </a:ln>
             <a:extLst>
               <a:ext uri="{91240B29-F687-4f45-9708-019B960494DF}">
-                <a14:hiddenLine xmlns:a14="http://schemas.microsoft.com/office/drawing/2010/main" xmlns="" w="9525">
+                <a14:hiddenLine xmlns="" xmlns:a14="http://schemas.microsoft.com/office/drawing/2010/main" w="9525">
                   <a:solidFill>
                     <a:srgbClr val="000000"/>
                   </a:solidFill>
@@ -2907,7 +2912,7 @@
             </a:ln>
             <a:extLst>
               <a:ext uri="{91240B29-F687-4f45-9708-019B960494DF}">
-                <a14:hiddenLine xmlns:a14="http://schemas.microsoft.com/office/drawing/2010/main" xmlns="" w="9525">
+                <a14:hiddenLine xmlns="" xmlns:a14="http://schemas.microsoft.com/office/drawing/2010/main" w="9525">
                   <a:solidFill>
                     <a:srgbClr val="000000"/>
                   </a:solidFill>
@@ -2969,7 +2974,7 @@
             </a:ln>
             <a:extLst>
               <a:ext uri="{91240B29-F687-4f45-9708-019B960494DF}">
-                <a14:hiddenLine xmlns:a14="http://schemas.microsoft.com/office/drawing/2010/main" xmlns="" w="9525">
+                <a14:hiddenLine xmlns="" xmlns:a14="http://schemas.microsoft.com/office/drawing/2010/main" w="9525">
                   <a:solidFill>
                     <a:srgbClr val="000000"/>
                   </a:solidFill>
@@ -3059,7 +3064,7 @@
             </a:ln>
             <a:extLst>
               <a:ext uri="{91240B29-F687-4f45-9708-019B960494DF}">
-                <a14:hiddenLine xmlns:a14="http://schemas.microsoft.com/office/drawing/2010/main" xmlns="" w="9525">
+                <a14:hiddenLine xmlns="" xmlns:a14="http://schemas.microsoft.com/office/drawing/2010/main" w="9525">
                   <a:solidFill>
                     <a:srgbClr val="000000"/>
                   </a:solidFill>
@@ -3121,7 +3126,7 @@
             </a:ln>
             <a:extLst>
               <a:ext uri="{91240B29-F687-4f45-9708-019B960494DF}">
-                <a14:hiddenLine xmlns:a14="http://schemas.microsoft.com/office/drawing/2010/main" xmlns="" w="9525">
+                <a14:hiddenLine xmlns="" xmlns:a14="http://schemas.microsoft.com/office/drawing/2010/main" w="9525">
                   <a:solidFill>
                     <a:srgbClr val="000000"/>
                   </a:solidFill>
@@ -3211,7 +3216,7 @@
             </a:ln>
             <a:extLst>
               <a:ext uri="{91240B29-F687-4f45-9708-019B960494DF}">
-                <a14:hiddenLine xmlns:a14="http://schemas.microsoft.com/office/drawing/2010/main" xmlns="" w="9525">
+                <a14:hiddenLine xmlns="" xmlns:a14="http://schemas.microsoft.com/office/drawing/2010/main" w="9525">
                   <a:solidFill>
                     <a:srgbClr val="000000"/>
                   </a:solidFill>
@@ -3245,7 +3250,7 @@
             </a:ln>
             <a:extLst>
               <a:ext uri="{91240B29-F687-4f45-9708-019B960494DF}">
-                <a14:hiddenLine xmlns:a14="http://schemas.microsoft.com/office/drawing/2010/main" xmlns="" w="9525">
+                <a14:hiddenLine xmlns="" xmlns:a14="http://schemas.microsoft.com/office/drawing/2010/main" w="9525">
                   <a:solidFill>
                     <a:srgbClr val="000000"/>
                   </a:solidFill>
@@ -3310,7 +3315,7 @@
             </a:ln>
             <a:extLst>
               <a:ext uri="{91240B29-F687-4f45-9708-019B960494DF}">
-                <a14:hiddenLine xmlns:a14="http://schemas.microsoft.com/office/drawing/2010/main" xmlns="" w="9525">
+                <a14:hiddenLine xmlns="" xmlns:a14="http://schemas.microsoft.com/office/drawing/2010/main" w="9525">
                   <a:solidFill>
                     <a:srgbClr val="000000"/>
                   </a:solidFill>
@@ -3400,7 +3405,7 @@
             </a:ln>
             <a:extLst>
               <a:ext uri="{91240B29-F687-4f45-9708-019B960494DF}">
-                <a14:hiddenLine xmlns:a14="http://schemas.microsoft.com/office/drawing/2010/main" xmlns="" w="9525">
+                <a14:hiddenLine xmlns="" xmlns:a14="http://schemas.microsoft.com/office/drawing/2010/main" w="9525">
                   <a:solidFill>
                     <a:srgbClr val="000000"/>
                   </a:solidFill>
@@ -3462,7 +3467,7 @@
             </a:ln>
             <a:extLst>
               <a:ext uri="{91240B29-F687-4f45-9708-019B960494DF}">
-                <a14:hiddenLine xmlns:a14="http://schemas.microsoft.com/office/drawing/2010/main" xmlns="" w="9525">
+                <a14:hiddenLine xmlns="" xmlns:a14="http://schemas.microsoft.com/office/drawing/2010/main" w="9525">
                   <a:solidFill>
                     <a:srgbClr val="000000"/>
                   </a:solidFill>
@@ -3552,7 +3557,7 @@
             </a:ln>
             <a:extLst>
               <a:ext uri="{91240B29-F687-4f45-9708-019B960494DF}">
-                <a14:hiddenLine xmlns:a14="http://schemas.microsoft.com/office/drawing/2010/main" xmlns="" w="9525">
+                <a14:hiddenLine xmlns="" xmlns:a14="http://schemas.microsoft.com/office/drawing/2010/main" w="9525">
                   <a:solidFill>
                     <a:srgbClr val="000000"/>
                   </a:solidFill>
@@ -3642,7 +3647,7 @@
             </a:ln>
             <a:extLst>
               <a:ext uri="{91240B29-F687-4f45-9708-019B960494DF}">
-                <a14:hiddenLine xmlns:a14="http://schemas.microsoft.com/office/drawing/2010/main" xmlns="" w="9525">
+                <a14:hiddenLine xmlns="" xmlns:a14="http://schemas.microsoft.com/office/drawing/2010/main" w="9525">
                   <a:solidFill>
                     <a:srgbClr val="000000"/>
                   </a:solidFill>
@@ -3707,7 +3712,7 @@
             </a:ln>
             <a:extLst>
               <a:ext uri="{91240B29-F687-4f45-9708-019B960494DF}">
-                <a14:hiddenLine xmlns:a14="http://schemas.microsoft.com/office/drawing/2010/main" xmlns="" w="9525">
+                <a14:hiddenLine xmlns="" xmlns:a14="http://schemas.microsoft.com/office/drawing/2010/main" w="9525">
                   <a:solidFill>
                     <a:srgbClr val="000000"/>
                   </a:solidFill>
@@ -3769,7 +3774,7 @@
             </a:ln>
             <a:extLst>
               <a:ext uri="{91240B29-F687-4f45-9708-019B960494DF}">
-                <a14:hiddenLine xmlns:a14="http://schemas.microsoft.com/office/drawing/2010/main" xmlns="" w="9525">
+                <a14:hiddenLine xmlns="" xmlns:a14="http://schemas.microsoft.com/office/drawing/2010/main" w="9525">
                   <a:solidFill>
                     <a:srgbClr val="000000"/>
                   </a:solidFill>
@@ -3859,7 +3864,7 @@
             </a:ln>
             <a:extLst>
               <a:ext uri="{91240B29-F687-4f45-9708-019B960494DF}">
-                <a14:hiddenLine xmlns:a14="http://schemas.microsoft.com/office/drawing/2010/main" xmlns="" w="9525">
+                <a14:hiddenLine xmlns="" xmlns:a14="http://schemas.microsoft.com/office/drawing/2010/main" w="9525">
                   <a:solidFill>
                     <a:srgbClr val="000000"/>
                   </a:solidFill>
@@ -3949,7 +3954,7 @@
             </a:ln>
             <a:extLst>
               <a:ext uri="{91240B29-F687-4f45-9708-019B960494DF}">
-                <a14:hiddenLine xmlns:a14="http://schemas.microsoft.com/office/drawing/2010/main" xmlns="" w="9525">
+                <a14:hiddenLine xmlns="" xmlns:a14="http://schemas.microsoft.com/office/drawing/2010/main" w="9525">
                   <a:solidFill>
                     <a:srgbClr val="000000"/>
                   </a:solidFill>
@@ -4011,7 +4016,7 @@
             </a:ln>
             <a:extLst>
               <a:ext uri="{91240B29-F687-4f45-9708-019B960494DF}">
-                <a14:hiddenLine xmlns:a14="http://schemas.microsoft.com/office/drawing/2010/main" xmlns="" w="9525">
+                <a14:hiddenLine xmlns="" xmlns:a14="http://schemas.microsoft.com/office/drawing/2010/main" w="9525">
                   <a:solidFill>
                     <a:srgbClr val="000000"/>
                   </a:solidFill>
@@ -4131,7 +4136,7 @@
             </a:ln>
             <a:extLst>
               <a:ext uri="{91240B29-F687-4f45-9708-019B960494DF}">
-                <a14:hiddenLine xmlns:a14="http://schemas.microsoft.com/office/drawing/2010/main" xmlns="" w="9525">
+                <a14:hiddenLine xmlns="" xmlns:a14="http://schemas.microsoft.com/office/drawing/2010/main" w="9525">
                   <a:solidFill>
                     <a:srgbClr val="000000"/>
                   </a:solidFill>
@@ -4199,7 +4204,7 @@
             </a:ln>
             <a:extLst>
               <a:ext uri="{91240B29-F687-4f45-9708-019B960494DF}">
-                <a14:hiddenLine xmlns:a14="http://schemas.microsoft.com/office/drawing/2010/main" xmlns="" w="9525">
+                <a14:hiddenLine xmlns="" xmlns:a14="http://schemas.microsoft.com/office/drawing/2010/main" w="9525">
                   <a:solidFill>
                     <a:srgbClr val="000000"/>
                   </a:solidFill>
@@ -4289,7 +4294,7 @@
             </a:ln>
             <a:extLst>
               <a:ext uri="{91240B29-F687-4f45-9708-019B960494DF}">
-                <a14:hiddenLine xmlns:a14="http://schemas.microsoft.com/office/drawing/2010/main" xmlns="" w="9525">
+                <a14:hiddenLine xmlns="" xmlns:a14="http://schemas.microsoft.com/office/drawing/2010/main" w="9525">
                   <a:solidFill>
                     <a:srgbClr val="000000"/>
                   </a:solidFill>
@@ -4429,7 +4434,7 @@
           <a:p>
             <a:fld id="{48A87A34-81AB-432B-8DAE-1953F412C126}" type="datetimeFigureOut">
               <a:rPr lang="en-US" dirty="0"/>
-              <a:t>9/3/2021</a:t>
+              <a:t>9/8/2021</a:t>
             </a:fld>
             <a:endParaRPr lang="en-US" dirty="0"/>
           </a:p>
@@ -4691,7 +4696,7 @@
           <a:p>
             <a:fld id="{48A87A34-81AB-432B-8DAE-1953F412C126}" type="datetimeFigureOut">
               <a:rPr lang="en-US" dirty="0"/>
-              <a:t>9/3/2021</a:t>
+              <a:t>9/8/2021</a:t>
             </a:fld>
             <a:endParaRPr lang="en-US" dirty="0"/>
           </a:p>
@@ -4882,7 +4887,7 @@
           <a:p>
             <a:fld id="{48A87A34-81AB-432B-8DAE-1953F412C126}" type="datetimeFigureOut">
               <a:rPr lang="en-US" dirty="0"/>
-              <a:t>9/3/2021</a:t>
+              <a:t>9/8/2021</a:t>
             </a:fld>
             <a:endParaRPr lang="en-US" dirty="0"/>
           </a:p>
@@ -5140,7 +5145,7 @@
           <a:p>
             <a:fld id="{48A87A34-81AB-432B-8DAE-1953F412C126}" type="datetimeFigureOut">
               <a:rPr lang="en-US" dirty="0"/>
-              <a:t>9/3/2021</a:t>
+              <a:t>9/8/2021</a:t>
             </a:fld>
             <a:endParaRPr lang="en-US" dirty="0"/>
           </a:p>
@@ -5569,7 +5574,7 @@
           <a:p>
             <a:fld id="{48A87A34-81AB-432B-8DAE-1953F412C126}" type="datetimeFigureOut">
               <a:rPr lang="en-US" dirty="0"/>
-              <a:t>9/3/2021</a:t>
+              <a:t>9/8/2021</a:t>
             </a:fld>
             <a:endParaRPr lang="en-US" dirty="0"/>
           </a:p>
@@ -6110,7 +6115,7 @@
           <a:p>
             <a:fld id="{48A87A34-81AB-432B-8DAE-1953F412C126}" type="datetimeFigureOut">
               <a:rPr lang="en-US" dirty="0"/>
-              <a:t>9/3/2021</a:t>
+              <a:t>9/8/2021</a:t>
             </a:fld>
             <a:endParaRPr lang="en-US" dirty="0"/>
           </a:p>
@@ -6825,7 +6830,7 @@
           <a:p>
             <a:fld id="{48A87A34-81AB-432B-8DAE-1953F412C126}" type="datetimeFigureOut">
               <a:rPr lang="en-US" dirty="0"/>
-              <a:t>9/3/2021</a:t>
+              <a:t>9/8/2021</a:t>
             </a:fld>
             <a:endParaRPr lang="en-US" dirty="0"/>
           </a:p>
@@ -6990,7 +6995,7 @@
           <a:p>
             <a:fld id="{48A87A34-81AB-432B-8DAE-1953F412C126}" type="datetimeFigureOut">
               <a:rPr lang="en-US" dirty="0"/>
-              <a:t>9/3/2021</a:t>
+              <a:t>9/8/2021</a:t>
             </a:fld>
             <a:endParaRPr lang="en-US" dirty="0"/>
           </a:p>
@@ -7165,7 +7170,7 @@
           <a:p>
             <a:fld id="{48A87A34-81AB-432B-8DAE-1953F412C126}" type="datetimeFigureOut">
               <a:rPr lang="en-US" dirty="0"/>
-              <a:t>9/3/2021</a:t>
+              <a:t>9/8/2021</a:t>
             </a:fld>
             <a:endParaRPr lang="en-US" dirty="0"/>
           </a:p>
@@ -7330,7 +7335,7 @@
           <a:p>
             <a:fld id="{48A87A34-81AB-432B-8DAE-1953F412C126}" type="datetimeFigureOut">
               <a:rPr lang="en-US" dirty="0"/>
-              <a:t>9/3/2021</a:t>
+              <a:t>9/8/2021</a:t>
             </a:fld>
             <a:endParaRPr lang="en-US" dirty="0"/>
           </a:p>
@@ -7575,7 +7580,7 @@
           <a:p>
             <a:fld id="{48A87A34-81AB-432B-8DAE-1953F412C126}" type="datetimeFigureOut">
               <a:rPr lang="en-US" dirty="0"/>
-              <a:t>9/3/2021</a:t>
+              <a:t>9/8/2021</a:t>
             </a:fld>
             <a:endParaRPr lang="en-US" dirty="0"/>
           </a:p>
@@ -7802,7 +7807,7 @@
           <a:p>
             <a:fld id="{48A87A34-81AB-432B-8DAE-1953F412C126}" type="datetimeFigureOut">
               <a:rPr lang="en-US" dirty="0"/>
-              <a:t>9/3/2021</a:t>
+              <a:t>9/8/2021</a:t>
             </a:fld>
             <a:endParaRPr lang="en-US" dirty="0"/>
           </a:p>
@@ -8178,7 +8183,7 @@
           <a:p>
             <a:fld id="{48A87A34-81AB-432B-8DAE-1953F412C126}" type="datetimeFigureOut">
               <a:rPr lang="en-US" dirty="0"/>
-              <a:t>9/3/2021</a:t>
+              <a:t>9/8/2021</a:t>
             </a:fld>
             <a:endParaRPr lang="en-US" dirty="0"/>
           </a:p>
@@ -8291,7 +8296,7 @@
           <a:p>
             <a:fld id="{48A87A34-81AB-432B-8DAE-1953F412C126}" type="datetimeFigureOut">
               <a:rPr lang="en-US" dirty="0"/>
-              <a:t>9/3/2021</a:t>
+              <a:t>9/8/2021</a:t>
             </a:fld>
             <a:endParaRPr lang="en-US" dirty="0"/>
           </a:p>
@@ -8381,7 +8386,7 @@
           <a:p>
             <a:fld id="{48A87A34-81AB-432B-8DAE-1953F412C126}" type="datetimeFigureOut">
               <a:rPr lang="en-US" dirty="0"/>
-              <a:t>9/3/2021</a:t>
+              <a:t>9/8/2021</a:t>
             </a:fld>
             <a:endParaRPr lang="en-US" dirty="0"/>
           </a:p>
@@ -8625,7 +8630,7 @@
           <a:p>
             <a:fld id="{48A87A34-81AB-432B-8DAE-1953F412C126}" type="datetimeFigureOut">
               <a:rPr lang="en-US" dirty="0"/>
-              <a:t>9/3/2021</a:t>
+              <a:t>9/8/2021</a:t>
             </a:fld>
             <a:endParaRPr lang="en-US" dirty="0"/>
           </a:p>
@@ -8900,7 +8905,7 @@
           <a:p>
             <a:fld id="{48A87A34-81AB-432B-8DAE-1953F412C126}" type="datetimeFigureOut">
               <a:rPr lang="en-US" dirty="0"/>
-              <a:t>9/3/2021</a:t>
+              <a:t>9/8/2021</a:t>
             </a:fld>
             <a:endParaRPr lang="en-US" dirty="0"/>
           </a:p>
@@ -9018,7 +9023,7 @@
           <a:noFill/>
           <a:extLst>
             <a:ext uri="{909E8E84-426E-40dd-AFC4-6F175D3DCCD1}">
-              <a14:hiddenFill xmlns:a14="http://schemas.microsoft.com/office/drawing/2010/main" xmlns="">
+              <a14:hiddenFill xmlns="" xmlns:a14="http://schemas.microsoft.com/office/drawing/2010/main">
                 <a:solidFill>
                   <a:srgbClr val="FFFFFF"/>
                 </a:solidFill>
@@ -9092,7 +9097,7 @@
               </a:ln>
               <a:extLst>
                 <a:ext uri="{91240B29-F687-4f45-9708-019B960494DF}">
-                  <a14:hiddenLine xmlns:a14="http://schemas.microsoft.com/office/drawing/2010/main" xmlns="" w="9525">
+                  <a14:hiddenLine xmlns="" xmlns:a14="http://schemas.microsoft.com/office/drawing/2010/main" w="9525">
                     <a:solidFill>
                       <a:srgbClr val="000000"/>
                     </a:solidFill>
@@ -9182,7 +9187,7 @@
               </a:ln>
               <a:extLst>
                 <a:ext uri="{91240B29-F687-4f45-9708-019B960494DF}">
-                  <a14:hiddenLine xmlns:a14="http://schemas.microsoft.com/office/drawing/2010/main" xmlns="" w="9525">
+                  <a14:hiddenLine xmlns="" xmlns:a14="http://schemas.microsoft.com/office/drawing/2010/main" w="9525">
                     <a:solidFill>
                       <a:srgbClr val="000000"/>
                     </a:solidFill>
@@ -9272,7 +9277,7 @@
               </a:ln>
               <a:extLst>
                 <a:ext uri="{91240B29-F687-4f45-9708-019B960494DF}">
-                  <a14:hiddenLine xmlns:a14="http://schemas.microsoft.com/office/drawing/2010/main" xmlns="" w="9525">
+                  <a14:hiddenLine xmlns="" xmlns:a14="http://schemas.microsoft.com/office/drawing/2010/main" w="9525">
                     <a:solidFill>
                       <a:srgbClr val="000000"/>
                     </a:solidFill>
@@ -9334,7 +9339,7 @@
               </a:ln>
               <a:extLst>
                 <a:ext uri="{91240B29-F687-4f45-9708-019B960494DF}">
-                  <a14:hiddenLine xmlns:a14="http://schemas.microsoft.com/office/drawing/2010/main" xmlns="" w="9525">
+                  <a14:hiddenLine xmlns="" xmlns:a14="http://schemas.microsoft.com/office/drawing/2010/main" w="9525">
                     <a:solidFill>
                       <a:srgbClr val="000000"/>
                     </a:solidFill>
@@ -9424,7 +9429,7 @@
               </a:ln>
               <a:extLst>
                 <a:ext uri="{91240B29-F687-4f45-9708-019B960494DF}">
-                  <a14:hiddenLine xmlns:a14="http://schemas.microsoft.com/office/drawing/2010/main" xmlns="" w="9525">
+                  <a14:hiddenLine xmlns="" xmlns:a14="http://schemas.microsoft.com/office/drawing/2010/main" w="9525">
                     <a:solidFill>
                       <a:srgbClr val="000000"/>
                     </a:solidFill>
@@ -9486,7 +9491,7 @@
               </a:ln>
               <a:extLst>
                 <a:ext uri="{91240B29-F687-4f45-9708-019B960494DF}">
-                  <a14:hiddenLine xmlns:a14="http://schemas.microsoft.com/office/drawing/2010/main" xmlns="" w="9525">
+                  <a14:hiddenLine xmlns="" xmlns:a14="http://schemas.microsoft.com/office/drawing/2010/main" w="9525">
                     <a:solidFill>
                       <a:srgbClr val="000000"/>
                     </a:solidFill>
@@ -9548,7 +9553,7 @@
               </a:ln>
               <a:extLst>
                 <a:ext uri="{91240B29-F687-4f45-9708-019B960494DF}">
-                  <a14:hiddenLine xmlns:a14="http://schemas.microsoft.com/office/drawing/2010/main" xmlns="" w="9525">
+                  <a14:hiddenLine xmlns="" xmlns:a14="http://schemas.microsoft.com/office/drawing/2010/main" w="9525">
                     <a:solidFill>
                       <a:srgbClr val="000000"/>
                     </a:solidFill>
@@ -9638,7 +9643,7 @@
               </a:ln>
               <a:extLst>
                 <a:ext uri="{91240B29-F687-4f45-9708-019B960494DF}">
-                  <a14:hiddenLine xmlns:a14="http://schemas.microsoft.com/office/drawing/2010/main" xmlns="" w="9525">
+                  <a14:hiddenLine xmlns="" xmlns:a14="http://schemas.microsoft.com/office/drawing/2010/main" w="9525">
                     <a:solidFill>
                       <a:srgbClr val="000000"/>
                     </a:solidFill>
@@ -9728,7 +9733,7 @@
               </a:ln>
               <a:extLst>
                 <a:ext uri="{91240B29-F687-4f45-9708-019B960494DF}">
-                  <a14:hiddenLine xmlns:a14="http://schemas.microsoft.com/office/drawing/2010/main" xmlns="" w="9525">
+                  <a14:hiddenLine xmlns="" xmlns:a14="http://schemas.microsoft.com/office/drawing/2010/main" w="9525">
                     <a:solidFill>
                       <a:srgbClr val="000000"/>
                     </a:solidFill>
@@ -9790,7 +9795,7 @@
               </a:ln>
               <a:extLst>
                 <a:ext uri="{91240B29-F687-4f45-9708-019B960494DF}">
-                  <a14:hiddenLine xmlns:a14="http://schemas.microsoft.com/office/drawing/2010/main" xmlns="" w="9525">
+                  <a14:hiddenLine xmlns="" xmlns:a14="http://schemas.microsoft.com/office/drawing/2010/main" w="9525">
                     <a:solidFill>
                       <a:srgbClr val="000000"/>
                     </a:solidFill>
@@ -9900,7 +9905,7 @@
               </a:ln>
               <a:extLst>
                 <a:ext uri="{91240B29-F687-4f45-9708-019B960494DF}">
-                  <a14:hiddenLine xmlns:a14="http://schemas.microsoft.com/office/drawing/2010/main" xmlns="" w="9525">
+                  <a14:hiddenLine xmlns="" xmlns:a14="http://schemas.microsoft.com/office/drawing/2010/main" w="9525">
                     <a:solidFill>
                       <a:srgbClr val="000000"/>
                     </a:solidFill>
@@ -9984,7 +9989,7 @@
               </a:ln>
               <a:extLst>
                 <a:ext uri="{91240B29-F687-4f45-9708-019B960494DF}">
-                  <a14:hiddenLine xmlns:a14="http://schemas.microsoft.com/office/drawing/2010/main" xmlns="" w="9525">
+                  <a14:hiddenLine xmlns="" xmlns:a14="http://schemas.microsoft.com/office/drawing/2010/main" w="9525">
                     <a:solidFill>
                       <a:srgbClr val="000000"/>
                     </a:solidFill>
@@ -10046,7 +10051,7 @@
               </a:ln>
               <a:extLst>
                 <a:ext uri="{91240B29-F687-4f45-9708-019B960494DF}">
-                  <a14:hiddenLine xmlns:a14="http://schemas.microsoft.com/office/drawing/2010/main" xmlns="" w="9525">
+                  <a14:hiddenLine xmlns="" xmlns:a14="http://schemas.microsoft.com/office/drawing/2010/main" w="9525">
                     <a:solidFill>
                       <a:srgbClr val="000000"/>
                     </a:solidFill>
@@ -10108,7 +10113,7 @@
               </a:ln>
               <a:extLst>
                 <a:ext uri="{91240B29-F687-4f45-9708-019B960494DF}">
-                  <a14:hiddenLine xmlns:a14="http://schemas.microsoft.com/office/drawing/2010/main" xmlns="" w="9525">
+                  <a14:hiddenLine xmlns="" xmlns:a14="http://schemas.microsoft.com/office/drawing/2010/main" w="9525">
                     <a:solidFill>
                       <a:srgbClr val="000000"/>
                     </a:solidFill>
@@ -10198,7 +10203,7 @@
               </a:ln>
               <a:extLst>
                 <a:ext uri="{91240B29-F687-4f45-9708-019B960494DF}">
-                  <a14:hiddenLine xmlns:a14="http://schemas.microsoft.com/office/drawing/2010/main" xmlns="" w="9525">
+                  <a14:hiddenLine xmlns="" xmlns:a14="http://schemas.microsoft.com/office/drawing/2010/main" w="9525">
                     <a:solidFill>
                       <a:srgbClr val="000000"/>
                     </a:solidFill>
@@ -10232,7 +10237,7 @@
               </a:ln>
               <a:extLst>
                 <a:ext uri="{91240B29-F687-4f45-9708-019B960494DF}">
-                  <a14:hiddenLine xmlns:a14="http://schemas.microsoft.com/office/drawing/2010/main" xmlns="" w="9525">
+                  <a14:hiddenLine xmlns="" xmlns:a14="http://schemas.microsoft.com/office/drawing/2010/main" w="9525">
                     <a:solidFill>
                       <a:srgbClr val="000000"/>
                     </a:solidFill>
@@ -10297,7 +10302,7 @@
               </a:ln>
               <a:extLst>
                 <a:ext uri="{91240B29-F687-4f45-9708-019B960494DF}">
-                  <a14:hiddenLine xmlns:a14="http://schemas.microsoft.com/office/drawing/2010/main" xmlns="" w="9525">
+                  <a14:hiddenLine xmlns="" xmlns:a14="http://schemas.microsoft.com/office/drawing/2010/main" w="9525">
                     <a:solidFill>
                       <a:srgbClr val="000000"/>
                     </a:solidFill>
@@ -10387,7 +10392,7 @@
               </a:ln>
               <a:extLst>
                 <a:ext uri="{91240B29-F687-4f45-9708-019B960494DF}">
-                  <a14:hiddenLine xmlns:a14="http://schemas.microsoft.com/office/drawing/2010/main" xmlns="" w="9525">
+                  <a14:hiddenLine xmlns="" xmlns:a14="http://schemas.microsoft.com/office/drawing/2010/main" w="9525">
                     <a:solidFill>
                       <a:srgbClr val="000000"/>
                     </a:solidFill>
@@ -10449,7 +10454,7 @@
               </a:ln>
               <a:extLst>
                 <a:ext uri="{91240B29-F687-4f45-9708-019B960494DF}">
-                  <a14:hiddenLine xmlns:a14="http://schemas.microsoft.com/office/drawing/2010/main" xmlns="" w="9525">
+                  <a14:hiddenLine xmlns="" xmlns:a14="http://schemas.microsoft.com/office/drawing/2010/main" w="9525">
                     <a:solidFill>
                       <a:srgbClr val="000000"/>
                     </a:solidFill>
@@ -10539,7 +10544,7 @@
               </a:ln>
               <a:extLst>
                 <a:ext uri="{91240B29-F687-4f45-9708-019B960494DF}">
-                  <a14:hiddenLine xmlns:a14="http://schemas.microsoft.com/office/drawing/2010/main" xmlns="" w="9525">
+                  <a14:hiddenLine xmlns="" xmlns:a14="http://schemas.microsoft.com/office/drawing/2010/main" w="9525">
                     <a:solidFill>
                       <a:srgbClr val="000000"/>
                     </a:solidFill>
@@ -10604,7 +10609,7 @@
               </a:ln>
               <a:extLst>
                 <a:ext uri="{91240B29-F687-4f45-9708-019B960494DF}">
-                  <a14:hiddenLine xmlns:a14="http://schemas.microsoft.com/office/drawing/2010/main" xmlns="" w="9525">
+                  <a14:hiddenLine xmlns="" xmlns:a14="http://schemas.microsoft.com/office/drawing/2010/main" w="9525">
                     <a:solidFill>
                       <a:srgbClr val="000000"/>
                     </a:solidFill>
@@ -10666,7 +10671,7 @@
               </a:ln>
               <a:extLst>
                 <a:ext uri="{91240B29-F687-4f45-9708-019B960494DF}">
-                  <a14:hiddenLine xmlns:a14="http://schemas.microsoft.com/office/drawing/2010/main" xmlns="" w="9525">
+                  <a14:hiddenLine xmlns="" xmlns:a14="http://schemas.microsoft.com/office/drawing/2010/main" w="9525">
                     <a:solidFill>
                       <a:srgbClr val="000000"/>
                     </a:solidFill>
@@ -10756,7 +10761,7 @@
               </a:ln>
               <a:extLst>
                 <a:ext uri="{91240B29-F687-4f45-9708-019B960494DF}">
-                  <a14:hiddenLine xmlns:a14="http://schemas.microsoft.com/office/drawing/2010/main" xmlns="" w="9525">
+                  <a14:hiddenLine xmlns="" xmlns:a14="http://schemas.microsoft.com/office/drawing/2010/main" w="9525">
                     <a:solidFill>
                       <a:srgbClr val="000000"/>
                     </a:solidFill>
@@ -10846,7 +10851,7 @@
               </a:ln>
               <a:extLst>
                 <a:ext uri="{91240B29-F687-4f45-9708-019B960494DF}">
-                  <a14:hiddenLine xmlns:a14="http://schemas.microsoft.com/office/drawing/2010/main" xmlns="" w="9525">
+                  <a14:hiddenLine xmlns="" xmlns:a14="http://schemas.microsoft.com/office/drawing/2010/main" w="9525">
                     <a:solidFill>
                       <a:srgbClr val="000000"/>
                     </a:solidFill>
@@ -10911,7 +10916,7 @@
               </a:ln>
               <a:extLst>
                 <a:ext uri="{91240B29-F687-4f45-9708-019B960494DF}">
-                  <a14:hiddenLine xmlns:a14="http://schemas.microsoft.com/office/drawing/2010/main" xmlns="" w="9525">
+                  <a14:hiddenLine xmlns="" xmlns:a14="http://schemas.microsoft.com/office/drawing/2010/main" w="9525">
                     <a:solidFill>
                       <a:srgbClr val="000000"/>
                     </a:solidFill>
@@ -11031,7 +11036,7 @@
               </a:ln>
               <a:extLst>
                 <a:ext uri="{91240B29-F687-4f45-9708-019B960494DF}">
-                  <a14:hiddenLine xmlns:a14="http://schemas.microsoft.com/office/drawing/2010/main" xmlns="" w="9525">
+                  <a14:hiddenLine xmlns="" xmlns:a14="http://schemas.microsoft.com/office/drawing/2010/main" w="9525">
                     <a:solidFill>
                       <a:srgbClr val="000000"/>
                     </a:solidFill>
@@ -11112,7 +11117,7 @@
               </a:ln>
               <a:extLst>
                 <a:ext uri="{91240B29-F687-4f45-9708-019B960494DF}">
-                  <a14:hiddenLine xmlns:a14="http://schemas.microsoft.com/office/drawing/2010/main" xmlns="" w="9525">
+                  <a14:hiddenLine xmlns="" xmlns:a14="http://schemas.microsoft.com/office/drawing/2010/main" w="9525">
                     <a:solidFill>
                       <a:srgbClr val="000000"/>
                     </a:solidFill>
@@ -11227,7 +11232,7 @@
               </a:ln>
               <a:extLst>
                 <a:ext uri="{91240B29-F687-4f45-9708-019B960494DF}">
-                  <a14:hiddenLine xmlns:a14="http://schemas.microsoft.com/office/drawing/2010/main" xmlns="" w="9525">
+                  <a14:hiddenLine xmlns="" xmlns:a14="http://schemas.microsoft.com/office/drawing/2010/main" w="9525">
                     <a:solidFill>
                       <a:srgbClr val="000000"/>
                     </a:solidFill>
@@ -11317,7 +11322,7 @@
               </a:ln>
               <a:extLst>
                 <a:ext uri="{91240B29-F687-4f45-9708-019B960494DF}">
-                  <a14:hiddenLine xmlns:a14="http://schemas.microsoft.com/office/drawing/2010/main" xmlns="" w="9525">
+                  <a14:hiddenLine xmlns="" xmlns:a14="http://schemas.microsoft.com/office/drawing/2010/main" w="9525">
                     <a:solidFill>
                       <a:srgbClr val="000000"/>
                     </a:solidFill>
@@ -11382,7 +11387,7 @@
               </a:ln>
               <a:extLst>
                 <a:ext uri="{91240B29-F687-4f45-9708-019B960494DF}">
-                  <a14:hiddenLine xmlns:a14="http://schemas.microsoft.com/office/drawing/2010/main" xmlns="" w="9525">
+                  <a14:hiddenLine xmlns="" xmlns:a14="http://schemas.microsoft.com/office/drawing/2010/main" w="9525">
                     <a:solidFill>
                       <a:srgbClr val="000000"/>
                     </a:solidFill>
@@ -11472,7 +11477,7 @@
               </a:ln>
               <a:extLst>
                 <a:ext uri="{91240B29-F687-4f45-9708-019B960494DF}">
-                  <a14:hiddenLine xmlns:a14="http://schemas.microsoft.com/office/drawing/2010/main" xmlns="" w="9525">
+                  <a14:hiddenLine xmlns="" xmlns:a14="http://schemas.microsoft.com/office/drawing/2010/main" w="9525">
                     <a:solidFill>
                       <a:srgbClr val="000000"/>
                     </a:solidFill>
@@ -11540,7 +11545,7 @@
               </a:ln>
               <a:extLst>
                 <a:ext uri="{91240B29-F687-4f45-9708-019B960494DF}">
-                  <a14:hiddenLine xmlns:a14="http://schemas.microsoft.com/office/drawing/2010/main" xmlns="" w="9525">
+                  <a14:hiddenLine xmlns="" xmlns:a14="http://schemas.microsoft.com/office/drawing/2010/main" w="9525">
                     <a:solidFill>
                       <a:srgbClr val="000000"/>
                     </a:solidFill>
@@ -11630,7 +11635,7 @@
               </a:ln>
               <a:extLst>
                 <a:ext uri="{91240B29-F687-4f45-9708-019B960494DF}">
-                  <a14:hiddenLine xmlns:a14="http://schemas.microsoft.com/office/drawing/2010/main" xmlns="" w="9525">
+                  <a14:hiddenLine xmlns="" xmlns:a14="http://schemas.microsoft.com/office/drawing/2010/main" w="9525">
                     <a:solidFill>
                       <a:srgbClr val="000000"/>
                     </a:solidFill>
@@ -11698,7 +11703,7 @@
               </a:ln>
               <a:extLst>
                 <a:ext uri="{91240B29-F687-4f45-9708-019B960494DF}">
-                  <a14:hiddenLine xmlns:a14="http://schemas.microsoft.com/office/drawing/2010/main" xmlns="" w="9525">
+                  <a14:hiddenLine xmlns="" xmlns:a14="http://schemas.microsoft.com/office/drawing/2010/main" w="9525">
                     <a:solidFill>
                       <a:srgbClr val="000000"/>
                     </a:solidFill>
@@ -11788,7 +11793,7 @@
               </a:ln>
               <a:extLst>
                 <a:ext uri="{91240B29-F687-4f45-9708-019B960494DF}">
-                  <a14:hiddenLine xmlns:a14="http://schemas.microsoft.com/office/drawing/2010/main" xmlns="" w="9525">
+                  <a14:hiddenLine xmlns="" xmlns:a14="http://schemas.microsoft.com/office/drawing/2010/main" w="9525">
                     <a:solidFill>
                       <a:srgbClr val="000000"/>
                     </a:solidFill>
@@ -11822,7 +11827,7 @@
               </a:ln>
               <a:extLst>
                 <a:ext uri="{91240B29-F687-4f45-9708-019B960494DF}">
-                  <a14:hiddenLine xmlns:a14="http://schemas.microsoft.com/office/drawing/2010/main" xmlns="" w="9525">
+                  <a14:hiddenLine xmlns="" xmlns:a14="http://schemas.microsoft.com/office/drawing/2010/main" w="9525">
                     <a:solidFill>
                       <a:srgbClr val="000000"/>
                     </a:solidFill>
@@ -11963,7 +11968,7 @@
             <a:fld id="{48A87A34-81AB-432B-8DAE-1953F412C126}" type="datetimeFigureOut">
               <a:rPr lang="en-US" dirty="0"/>
               <a:pPr/>
-              <a:t>9/3/2021</a:t>
+              <a:t>9/8/2021</a:t>
             </a:fld>
             <a:endParaRPr lang="en-US" dirty="0"/>
           </a:p>
@@ -14243,33 +14248,45 @@
           <a:lstStyle/>
           <a:p>
             <a:r>
-              <a:rPr lang="fr-FR" dirty="0"/>
+              <a:rPr lang="fr-FR" sz="3600" dirty="0"/>
               <a:t>Le client :</a:t>
             </a:r>
           </a:p>
           <a:p>
-            <a:pPr lvl="1"/>
+            <a:pPr lvl="1">
+              <a:buFont typeface="Wingdings" panose="05000000000000000000" pitchFamily="2" charset="2"/>
+              <a:buChar char="Ø"/>
+            </a:pPr>
             <a:r>
               <a:rPr lang="fr-FR" dirty="0"/>
               <a:t>Droits restreints </a:t>
             </a:r>
           </a:p>
           <a:p>
-            <a:pPr lvl="1"/>
+            <a:pPr lvl="1">
+              <a:buFont typeface="Wingdings" panose="05000000000000000000" pitchFamily="2" charset="2"/>
+              <a:buChar char="Ø"/>
+            </a:pPr>
             <a:r>
               <a:rPr lang="fr-FR" dirty="0"/>
               <a:t>Consultation des produits</a:t>
             </a:r>
           </a:p>
           <a:p>
-            <a:pPr lvl="1"/>
+            <a:pPr lvl="1">
+              <a:buFont typeface="Wingdings" panose="05000000000000000000" pitchFamily="2" charset="2"/>
+              <a:buChar char="Ø"/>
+            </a:pPr>
             <a:r>
               <a:rPr lang="fr-FR" dirty="0"/>
               <a:t>Modification du mot de passe</a:t>
             </a:r>
           </a:p>
           <a:p>
-            <a:pPr lvl="1"/>
+            <a:pPr lvl="1">
+              <a:buFont typeface="Wingdings" panose="05000000000000000000" pitchFamily="2" charset="2"/>
+              <a:buChar char="Ø"/>
+            </a:pPr>
             <a:r>
               <a:rPr lang="fr-FR" dirty="0"/>
               <a:t>Etat d’avancement des commandes</a:t>
@@ -14679,9 +14696,10 @@
           <a:lstStyle/>
           <a:p>
             <a:r>
-              <a:rPr lang="fr-FR" sz="2800"/>
+              <a:rPr lang="fr-FR" sz="2800" dirty="0" err="1"/>
               <a:t>specification</a:t>
             </a:r>
+            <a:endParaRPr lang="fr-FR" sz="2800" dirty="0"/>
           </a:p>
         </p:txBody>
       </p:sp>
@@ -14829,12 +14847,12 @@
           <a:lstStyle/>
           <a:p>
             <a:r>
-              <a:rPr lang="fr-FR" sz="1800"/>
+              <a:rPr lang="fr-FR" sz="2800" dirty="0"/>
               <a:t>Schéma de la base de données</a:t>
             </a:r>
           </a:p>
           <a:p>
-            <a:endParaRPr lang="fr-FR" sz="1800"/>
+            <a:endParaRPr lang="fr-FR" sz="1800" dirty="0"/>
           </a:p>
         </p:txBody>
       </p:sp>
@@ -19615,43 +19633,6 @@
           </a:p>
         </p:txBody>
       </p:sp>
-      <p:pic>
-        <p:nvPicPr>
-          <p:cNvPr id="4" name="Espace réservé du contenu 3">
-            <a:extLst>
-              <a:ext uri="{FF2B5EF4-FFF2-40B4-BE49-F238E27FC236}">
-                <a16:creationId xmlns:a16="http://schemas.microsoft.com/office/drawing/2014/main" id="{17BED607-7ED1-46AA-ABED-8F7673E0B052}"/>
-              </a:ext>
-            </a:extLst>
-          </p:cNvPr>
-          <p:cNvPicPr>
-            <a:picLocks/>
-          </p:cNvPicPr>
-          <p:nvPr/>
-        </p:nvPicPr>
-        <p:blipFill>
-          <a:blip r:embed="rId3" cstate="print">
-            <a:extLst>
-              <a:ext uri="{28A0092B-C50C-407E-A947-70E740481C1C}">
-                <a14:useLocalDpi xmlns:a14="http://schemas.microsoft.com/office/drawing/2010/main" val="0"/>
-              </a:ext>
-            </a:extLst>
-          </a:blip>
-          <a:stretch>
-            <a:fillRect/>
-          </a:stretch>
-        </p:blipFill>
-        <p:spPr bwMode="auto">
-          <a:xfrm>
-            <a:off x="1118988" y="1653679"/>
-            <a:ext cx="6112382" cy="3545181"/>
-          </a:xfrm>
-          <a:prstGeom prst="rect">
-            <a:avLst/>
-          </a:prstGeom>
-          <a:noFill/>
-        </p:spPr>
-      </p:pic>
       <p:sp>
         <p:nvSpPr>
           <p:cNvPr id="8" name="Content Placeholder 7">
@@ -21728,7 +21709,7 @@
             <a:pPr algn="ctr"/>
             <a:r>
               <a:rPr lang="fr-FR" dirty="0"/>
-              <a:t>Chartre graphique</a:t>
+              <a:t>Charte graphique</a:t>
             </a:r>
           </a:p>
         </p:txBody>
@@ -22157,9 +22138,18 @@
           <a:lstStyle/>
           <a:p>
             <a:r>
-              <a:rPr lang="en-US"/>
-              <a:t>Chartre graphique</a:t>
+              <a:rPr lang="en-US" dirty="0" err="1"/>
+              <a:t>Chartee</a:t>
             </a:r>
+            <a:r>
+              <a:rPr lang="en-US" dirty="0"/>
+              <a:t> </a:t>
+            </a:r>
+            <a:r>
+              <a:rPr lang="en-US" dirty="0" err="1"/>
+              <a:t>graphique</a:t>
+            </a:r>
+            <a:endParaRPr lang="en-US" dirty="0"/>
           </a:p>
         </p:txBody>
       </p:sp>
@@ -22265,7 +22255,7 @@
         </p:blipFill>
         <p:spPr>
           <a:xfrm>
-            <a:off x="1118987" y="3290239"/>
+            <a:off x="1118986" y="3290239"/>
             <a:ext cx="4635583" cy="1460209"/>
           </a:xfrm>
           <a:prstGeom prst="rect">
@@ -27674,43 +27664,6 @@
           </a:p>
         </p:txBody>
       </p:sp>
-      <p:pic>
-        <p:nvPicPr>
-          <p:cNvPr id="4" name="Espace réservé du contenu 3">
-            <a:extLst>
-              <a:ext uri="{FF2B5EF4-FFF2-40B4-BE49-F238E27FC236}">
-                <a16:creationId xmlns:a16="http://schemas.microsoft.com/office/drawing/2014/main" id="{87ED23C2-DD1F-4E65-8280-D1061BA1708D}"/>
-              </a:ext>
-            </a:extLst>
-          </p:cNvPr>
-          <p:cNvPicPr>
-            <a:picLocks/>
-          </p:cNvPicPr>
-          <p:nvPr/>
-        </p:nvPicPr>
-        <p:blipFill>
-          <a:blip r:embed="rId3" cstate="print">
-            <a:extLst>
-              <a:ext uri="{28A0092B-C50C-407E-A947-70E740481C1C}">
-                <a14:useLocalDpi xmlns:a14="http://schemas.microsoft.com/office/drawing/2010/main" val="0"/>
-              </a:ext>
-            </a:extLst>
-          </a:blip>
-          <a:stretch>
-            <a:fillRect/>
-          </a:stretch>
-        </p:blipFill>
-        <p:spPr bwMode="auto">
-          <a:xfrm>
-            <a:off x="1118988" y="2081546"/>
-            <a:ext cx="6112382" cy="2689447"/>
-          </a:xfrm>
-          <a:prstGeom prst="rect">
-            <a:avLst/>
-          </a:prstGeom>
-          <a:noFill/>
-        </p:spPr>
-      </p:pic>
       <p:sp>
         <p:nvSpPr>
           <p:cNvPr id="8" name="Content Placeholder 7">
@@ -28080,6 +28033,36 @@
           </a:p>
         </p:txBody>
       </p:sp>
+      <p:pic>
+        <p:nvPicPr>
+          <p:cNvPr id="5" name="Image 4">
+            <a:extLst>
+              <a:ext uri="{FF2B5EF4-FFF2-40B4-BE49-F238E27FC236}">
+                <a16:creationId xmlns:a16="http://schemas.microsoft.com/office/drawing/2014/main" id="{CA48F470-5326-4258-A820-2680BEEE6DCC}"/>
+              </a:ext>
+            </a:extLst>
+          </p:cNvPr>
+          <p:cNvPicPr>
+            <a:picLocks noChangeAspect="1"/>
+          </p:cNvPicPr>
+          <p:nvPr/>
+        </p:nvPicPr>
+        <p:blipFill>
+          <a:blip r:embed="rId3"/>
+          <a:stretch>
+            <a:fillRect/>
+          </a:stretch>
+        </p:blipFill>
+        <p:spPr>
+          <a:xfrm>
+            <a:off x="989679" y="1860404"/>
+            <a:ext cx="6371000" cy="3129699"/>
+          </a:xfrm>
+          <a:prstGeom prst="rect">
+            <a:avLst/>
+          </a:prstGeom>
+        </p:spPr>
+      </p:pic>
     </p:spTree>
     <p:extLst>
       <p:ext uri="{BB962C8B-B14F-4D97-AF65-F5344CB8AC3E}">
@@ -30671,16 +30654,7 @@
               <a:rPr lang="fr-FR" sz="4000" dirty="0"/>
               <a:t> :</a:t>
             </a:r>
-          </a:p>
-          <a:p>
-            <a:pPr>
-              <a:buFont typeface="Wingdings" panose="05000000000000000000" pitchFamily="2" charset="2"/>
-              <a:buChar char="Ø"/>
-            </a:pPr>
-            <a:r>
-              <a:rPr lang="fr-FR" dirty="0"/>
-              <a:t> Fondée en 2021</a:t>
-            </a:r>
+            <a:endParaRPr lang="fr-FR" dirty="0"/>
           </a:p>
           <a:p>
             <a:pPr>
@@ -32354,7 +32328,7 @@
           <a:noFill/>
           <a:extLst>
             <a:ext uri="{909E8E84-426E-40dd-AFC4-6F175D3DCCD1}">
-              <a14:hiddenFill xmlns="" xmlns:a16="http://schemas.microsoft.com/office/drawing/2014/main" xmlns:p14="http://schemas.microsoft.com/office/powerpoint/2010/main" xmlns:a14="http://schemas.microsoft.com/office/drawing/2010/main">
+              <a14:hiddenFill xmlns:a14="http://schemas.microsoft.com/office/drawing/2010/main" xmlns:p14="http://schemas.microsoft.com/office/powerpoint/2010/main" xmlns:a16="http://schemas.microsoft.com/office/drawing/2014/main" xmlns="">
                 <a:solidFill>
                   <a:srgbClr val="FFFFFF"/>
                 </a:solidFill>
@@ -32445,7 +32419,7 @@
             </a:ln>
             <a:extLst>
               <a:ext uri="{91240B29-F687-4f45-9708-019B960494DF}">
-                <a14:hiddenLine xmlns="" xmlns:a16="http://schemas.microsoft.com/office/drawing/2014/main" xmlns:p14="http://schemas.microsoft.com/office/powerpoint/2010/main" xmlns:a14="http://schemas.microsoft.com/office/drawing/2010/main" w="9525">
+                <a14:hiddenLine xmlns:a14="http://schemas.microsoft.com/office/drawing/2010/main" xmlns:p14="http://schemas.microsoft.com/office/powerpoint/2010/main" xmlns:a16="http://schemas.microsoft.com/office/drawing/2014/main" xmlns="" w="9525">
                   <a:solidFill>
                     <a:srgbClr val="000000"/>
                   </a:solidFill>
@@ -32550,7 +32524,7 @@
             </a:ln>
             <a:extLst>
               <a:ext uri="{91240B29-F687-4f45-9708-019B960494DF}">
-                <a14:hiddenLine xmlns="" xmlns:a16="http://schemas.microsoft.com/office/drawing/2014/main" xmlns:p14="http://schemas.microsoft.com/office/powerpoint/2010/main" xmlns:a14="http://schemas.microsoft.com/office/drawing/2010/main" w="9525">
+                <a14:hiddenLine xmlns:a14="http://schemas.microsoft.com/office/drawing/2010/main" xmlns:p14="http://schemas.microsoft.com/office/powerpoint/2010/main" xmlns:a16="http://schemas.microsoft.com/office/drawing/2014/main" xmlns="" w="9525">
                   <a:solidFill>
                     <a:srgbClr val="000000"/>
                   </a:solidFill>
@@ -32655,7 +32629,7 @@
             </a:ln>
             <a:extLst>
               <a:ext uri="{91240B29-F687-4f45-9708-019B960494DF}">
-                <a14:hiddenLine xmlns="" xmlns:a16="http://schemas.microsoft.com/office/drawing/2014/main" xmlns:p14="http://schemas.microsoft.com/office/powerpoint/2010/main" xmlns:a14="http://schemas.microsoft.com/office/drawing/2010/main" w="9525">
+                <a14:hiddenLine xmlns:a14="http://schemas.microsoft.com/office/drawing/2010/main" xmlns:p14="http://schemas.microsoft.com/office/powerpoint/2010/main" xmlns:a16="http://schemas.microsoft.com/office/drawing/2014/main" xmlns="" w="9525">
                   <a:solidFill>
                     <a:srgbClr val="000000"/>
                   </a:solidFill>
@@ -32704,7 +32678,7 @@
             </a:ln>
             <a:extLst>
               <a:ext uri="{91240B29-F687-4f45-9708-019B960494DF}">
-                <a14:hiddenLine xmlns="" xmlns:a16="http://schemas.microsoft.com/office/drawing/2014/main" xmlns:p14="http://schemas.microsoft.com/office/powerpoint/2010/main" xmlns:a14="http://schemas.microsoft.com/office/drawing/2010/main" w="9525">
+                <a14:hiddenLine xmlns:a14="http://schemas.microsoft.com/office/drawing/2010/main" xmlns:p14="http://schemas.microsoft.com/office/powerpoint/2010/main" xmlns:a16="http://schemas.microsoft.com/office/drawing/2014/main" xmlns="" w="9525">
                   <a:solidFill>
                     <a:srgbClr val="000000"/>
                   </a:solidFill>
@@ -32809,7 +32783,7 @@
             </a:ln>
             <a:extLst>
               <a:ext uri="{91240B29-F687-4f45-9708-019B960494DF}">
-                <a14:hiddenLine xmlns="" xmlns:a16="http://schemas.microsoft.com/office/drawing/2014/main" xmlns:p14="http://schemas.microsoft.com/office/powerpoint/2010/main" xmlns:a14="http://schemas.microsoft.com/office/drawing/2010/main" w="9525">
+                <a14:hiddenLine xmlns:a14="http://schemas.microsoft.com/office/drawing/2010/main" xmlns:p14="http://schemas.microsoft.com/office/powerpoint/2010/main" xmlns:a16="http://schemas.microsoft.com/office/drawing/2014/main" xmlns="" w="9525">
                   <a:solidFill>
                     <a:srgbClr val="000000"/>
                   </a:solidFill>
@@ -32886,7 +32860,7 @@
             </a:ln>
             <a:extLst>
               <a:ext uri="{91240B29-F687-4f45-9708-019B960494DF}">
-                <a14:hiddenLine xmlns="" xmlns:a16="http://schemas.microsoft.com/office/drawing/2014/main" xmlns:p14="http://schemas.microsoft.com/office/powerpoint/2010/main" xmlns:a14="http://schemas.microsoft.com/office/drawing/2010/main" w="9525">
+                <a14:hiddenLine xmlns:a14="http://schemas.microsoft.com/office/drawing/2010/main" xmlns:p14="http://schemas.microsoft.com/office/powerpoint/2010/main" xmlns:a16="http://schemas.microsoft.com/office/drawing/2014/main" xmlns="" w="9525">
                   <a:solidFill>
                     <a:srgbClr val="000000"/>
                   </a:solidFill>
@@ -32963,7 +32937,7 @@
             </a:ln>
             <a:extLst>
               <a:ext uri="{91240B29-F687-4f45-9708-019B960494DF}">
-                <a14:hiddenLine xmlns="" xmlns:a16="http://schemas.microsoft.com/office/drawing/2014/main" xmlns:p14="http://schemas.microsoft.com/office/powerpoint/2010/main" xmlns:a14="http://schemas.microsoft.com/office/drawing/2010/main" w="9525">
+                <a14:hiddenLine xmlns:a14="http://schemas.microsoft.com/office/drawing/2010/main" xmlns:p14="http://schemas.microsoft.com/office/powerpoint/2010/main" xmlns:a16="http://schemas.microsoft.com/office/drawing/2014/main" xmlns="" w="9525">
                   <a:solidFill>
                     <a:srgbClr val="000000"/>
                   </a:solidFill>
@@ -33068,7 +33042,7 @@
             </a:ln>
             <a:extLst>
               <a:ext uri="{91240B29-F687-4f45-9708-019B960494DF}">
-                <a14:hiddenLine xmlns="" xmlns:a16="http://schemas.microsoft.com/office/drawing/2014/main" xmlns:p14="http://schemas.microsoft.com/office/powerpoint/2010/main" xmlns:a14="http://schemas.microsoft.com/office/drawing/2010/main" w="9525">
+                <a14:hiddenLine xmlns:a14="http://schemas.microsoft.com/office/drawing/2010/main" xmlns:p14="http://schemas.microsoft.com/office/powerpoint/2010/main" xmlns:a16="http://schemas.microsoft.com/office/drawing/2014/main" xmlns="" w="9525">
                   <a:solidFill>
                     <a:srgbClr val="000000"/>
                   </a:solidFill>
@@ -33145,7 +33119,7 @@
             </a:ln>
             <a:extLst>
               <a:ext uri="{91240B29-F687-4f45-9708-019B960494DF}">
-                <a14:hiddenLine xmlns="" xmlns:a16="http://schemas.microsoft.com/office/drawing/2014/main" xmlns:p14="http://schemas.microsoft.com/office/powerpoint/2010/main" xmlns:a14="http://schemas.microsoft.com/office/drawing/2010/main" w="9525">
+                <a14:hiddenLine xmlns:a14="http://schemas.microsoft.com/office/drawing/2010/main" xmlns:p14="http://schemas.microsoft.com/office/powerpoint/2010/main" xmlns:a16="http://schemas.microsoft.com/office/drawing/2014/main" xmlns="" w="9525">
                   <a:solidFill>
                     <a:srgbClr val="000000"/>
                   </a:solidFill>
@@ -33222,7 +33196,7 @@
             </a:ln>
             <a:extLst>
               <a:ext uri="{91240B29-F687-4f45-9708-019B960494DF}">
-                <a14:hiddenLine xmlns="" xmlns:a16="http://schemas.microsoft.com/office/drawing/2014/main" xmlns:p14="http://schemas.microsoft.com/office/powerpoint/2010/main" xmlns:a14="http://schemas.microsoft.com/office/drawing/2010/main" w="9525">
+                <a14:hiddenLine xmlns:a14="http://schemas.microsoft.com/office/drawing/2010/main" xmlns:p14="http://schemas.microsoft.com/office/powerpoint/2010/main" xmlns:a16="http://schemas.microsoft.com/office/drawing/2014/main" xmlns="" w="9525">
                   <a:solidFill>
                     <a:srgbClr val="000000"/>
                   </a:solidFill>
@@ -33327,7 +33301,7 @@
             </a:ln>
             <a:extLst>
               <a:ext uri="{91240B29-F687-4f45-9708-019B960494DF}">
-                <a14:hiddenLine xmlns="" xmlns:a16="http://schemas.microsoft.com/office/drawing/2014/main" xmlns:p14="http://schemas.microsoft.com/office/powerpoint/2010/main" xmlns:a14="http://schemas.microsoft.com/office/drawing/2010/main" w="9525">
+                <a14:hiddenLine xmlns:a14="http://schemas.microsoft.com/office/drawing/2010/main" xmlns:p14="http://schemas.microsoft.com/office/powerpoint/2010/main" xmlns:a16="http://schemas.microsoft.com/office/drawing/2014/main" xmlns="" w="9525">
                   <a:solidFill>
                     <a:srgbClr val="000000"/>
                   </a:solidFill>
@@ -33432,7 +33406,7 @@
             </a:ln>
             <a:extLst>
               <a:ext uri="{91240B29-F687-4f45-9708-019B960494DF}">
-                <a14:hiddenLine xmlns="" xmlns:a16="http://schemas.microsoft.com/office/drawing/2014/main" xmlns:p14="http://schemas.microsoft.com/office/powerpoint/2010/main" xmlns:a14="http://schemas.microsoft.com/office/drawing/2010/main" w="9525">
+                <a14:hiddenLine xmlns:a14="http://schemas.microsoft.com/office/drawing/2010/main" xmlns:p14="http://schemas.microsoft.com/office/powerpoint/2010/main" xmlns:a16="http://schemas.microsoft.com/office/drawing/2014/main" xmlns="" w="9525">
                   <a:solidFill>
                     <a:srgbClr val="000000"/>
                   </a:solidFill>
@@ -33509,7 +33483,7 @@
             </a:ln>
             <a:extLst>
               <a:ext uri="{91240B29-F687-4f45-9708-019B960494DF}">
-                <a14:hiddenLine xmlns="" xmlns:a16="http://schemas.microsoft.com/office/drawing/2014/main" xmlns:p14="http://schemas.microsoft.com/office/powerpoint/2010/main" xmlns:a14="http://schemas.microsoft.com/office/drawing/2010/main" w="9525">
+                <a14:hiddenLine xmlns:a14="http://schemas.microsoft.com/office/drawing/2010/main" xmlns:p14="http://schemas.microsoft.com/office/powerpoint/2010/main" xmlns:a16="http://schemas.microsoft.com/office/drawing/2014/main" xmlns="" w="9525">
                   <a:solidFill>
                     <a:srgbClr val="000000"/>
                   </a:solidFill>
@@ -33634,7 +33608,7 @@
             </a:ln>
             <a:extLst>
               <a:ext uri="{91240B29-F687-4f45-9708-019B960494DF}">
-                <a14:hiddenLine xmlns="" xmlns:a16="http://schemas.microsoft.com/office/drawing/2014/main" xmlns:p14="http://schemas.microsoft.com/office/powerpoint/2010/main" xmlns:a14="http://schemas.microsoft.com/office/drawing/2010/main" w="9525">
+                <a14:hiddenLine xmlns:a14="http://schemas.microsoft.com/office/drawing/2010/main" xmlns:p14="http://schemas.microsoft.com/office/powerpoint/2010/main" xmlns:a16="http://schemas.microsoft.com/office/drawing/2014/main" xmlns="" w="9525">
                   <a:solidFill>
                     <a:srgbClr val="000000"/>
                   </a:solidFill>
@@ -33711,7 +33685,7 @@
             </a:ln>
             <a:extLst>
               <a:ext uri="{91240B29-F687-4f45-9708-019B960494DF}">
-                <a14:hiddenLine xmlns="" xmlns:a16="http://schemas.microsoft.com/office/drawing/2014/main" xmlns:p14="http://schemas.microsoft.com/office/powerpoint/2010/main" xmlns:a14="http://schemas.microsoft.com/office/drawing/2010/main" w="9525">
+                <a14:hiddenLine xmlns:a14="http://schemas.microsoft.com/office/drawing/2010/main" xmlns:p14="http://schemas.microsoft.com/office/powerpoint/2010/main" xmlns:a16="http://schemas.microsoft.com/office/drawing/2014/main" xmlns="" w="9525">
                   <a:solidFill>
                     <a:srgbClr val="000000"/>
                   </a:solidFill>
@@ -33816,7 +33790,7 @@
             </a:ln>
             <a:extLst>
               <a:ext uri="{91240B29-F687-4f45-9708-019B960494DF}">
-                <a14:hiddenLine xmlns="" xmlns:a16="http://schemas.microsoft.com/office/drawing/2014/main" xmlns:p14="http://schemas.microsoft.com/office/powerpoint/2010/main" xmlns:a14="http://schemas.microsoft.com/office/drawing/2010/main" w="9525">
+                <a14:hiddenLine xmlns:a14="http://schemas.microsoft.com/office/drawing/2010/main" xmlns:p14="http://schemas.microsoft.com/office/powerpoint/2010/main" xmlns:a16="http://schemas.microsoft.com/office/drawing/2014/main" xmlns="" w="9525">
                   <a:solidFill>
                     <a:srgbClr val="000000"/>
                   </a:solidFill>
@@ -33921,7 +33895,7 @@
             </a:ln>
             <a:extLst>
               <a:ext uri="{91240B29-F687-4f45-9708-019B960494DF}">
-                <a14:hiddenLine xmlns="" xmlns:a16="http://schemas.microsoft.com/office/drawing/2014/main" xmlns:p14="http://schemas.microsoft.com/office/powerpoint/2010/main" xmlns:a14="http://schemas.microsoft.com/office/drawing/2010/main" w="9525">
+                <a14:hiddenLine xmlns:a14="http://schemas.microsoft.com/office/drawing/2010/main" xmlns:p14="http://schemas.microsoft.com/office/powerpoint/2010/main" xmlns:a16="http://schemas.microsoft.com/office/drawing/2014/main" xmlns="" w="9525">
                   <a:solidFill>
                     <a:srgbClr val="000000"/>
                   </a:solidFill>
@@ -33998,7 +33972,7 @@
             </a:ln>
             <a:extLst>
               <a:ext uri="{91240B29-F687-4f45-9708-019B960494DF}">
-                <a14:hiddenLine xmlns="" xmlns:a16="http://schemas.microsoft.com/office/drawing/2014/main" xmlns:p14="http://schemas.microsoft.com/office/powerpoint/2010/main" xmlns:a14="http://schemas.microsoft.com/office/drawing/2010/main" w="9525">
+                <a14:hiddenLine xmlns:a14="http://schemas.microsoft.com/office/drawing/2010/main" xmlns:p14="http://schemas.microsoft.com/office/powerpoint/2010/main" xmlns:a16="http://schemas.microsoft.com/office/drawing/2014/main" xmlns="" w="9525">
                   <a:solidFill>
                     <a:srgbClr val="000000"/>
                   </a:solidFill>
@@ -34103,7 +34077,7 @@
             </a:ln>
             <a:extLst>
               <a:ext uri="{91240B29-F687-4f45-9708-019B960494DF}">
-                <a14:hiddenLine xmlns="" xmlns:a16="http://schemas.microsoft.com/office/drawing/2014/main" xmlns:p14="http://schemas.microsoft.com/office/powerpoint/2010/main" xmlns:a14="http://schemas.microsoft.com/office/drawing/2010/main" w="9525">
+                <a14:hiddenLine xmlns:a14="http://schemas.microsoft.com/office/drawing/2010/main" xmlns:p14="http://schemas.microsoft.com/office/powerpoint/2010/main" xmlns:a16="http://schemas.microsoft.com/office/drawing/2014/main" xmlns="" w="9525">
                   <a:solidFill>
                     <a:srgbClr val="000000"/>
                   </a:solidFill>
@@ -34208,7 +34182,7 @@
             </a:ln>
             <a:extLst>
               <a:ext uri="{91240B29-F687-4f45-9708-019B960494DF}">
-                <a14:hiddenLine xmlns="" xmlns:a16="http://schemas.microsoft.com/office/drawing/2014/main" xmlns:p14="http://schemas.microsoft.com/office/powerpoint/2010/main" xmlns:a14="http://schemas.microsoft.com/office/drawing/2010/main" w="9525">
+                <a14:hiddenLine xmlns:a14="http://schemas.microsoft.com/office/drawing/2010/main" xmlns:p14="http://schemas.microsoft.com/office/powerpoint/2010/main" xmlns:a16="http://schemas.microsoft.com/office/drawing/2014/main" xmlns="" w="9525">
                   <a:solidFill>
                     <a:srgbClr val="000000"/>
                   </a:solidFill>
@@ -34279,7 +34253,7 @@
             </a:ln>
             <a:extLst>
               <a:ext uri="{91240B29-F687-4f45-9708-019B960494DF}">
-                <a14:hiddenLine xmlns="" xmlns:a16="http://schemas.microsoft.com/office/drawing/2014/main" xmlns:p14="http://schemas.microsoft.com/office/powerpoint/2010/main" xmlns:a14="http://schemas.microsoft.com/office/drawing/2010/main" w="9525">
+                <a14:hiddenLine xmlns:a14="http://schemas.microsoft.com/office/drawing/2010/main" xmlns:p14="http://schemas.microsoft.com/office/powerpoint/2010/main" xmlns:a16="http://schemas.microsoft.com/office/drawing/2014/main" xmlns="" w="9525">
                   <a:solidFill>
                     <a:srgbClr val="000000"/>
                   </a:solidFill>
@@ -34384,7 +34358,7 @@
             </a:ln>
             <a:extLst>
               <a:ext uri="{91240B29-F687-4f45-9708-019B960494DF}">
-                <a14:hiddenLine xmlns="" xmlns:a16="http://schemas.microsoft.com/office/drawing/2014/main" xmlns:p14="http://schemas.microsoft.com/office/powerpoint/2010/main" xmlns:a14="http://schemas.microsoft.com/office/drawing/2010/main" w="9525">
+                <a14:hiddenLine xmlns:a14="http://schemas.microsoft.com/office/drawing/2010/main" xmlns:p14="http://schemas.microsoft.com/office/powerpoint/2010/main" xmlns:a16="http://schemas.microsoft.com/office/drawing/2014/main" xmlns="" w="9525">
                   <a:solidFill>
                     <a:srgbClr val="000000"/>
                   </a:solidFill>
@@ -34455,7 +34429,7 @@
             </a:ln>
             <a:extLst>
               <a:ext uri="{91240B29-F687-4f45-9708-019B960494DF}">
-                <a14:hiddenLine xmlns="" xmlns:a16="http://schemas.microsoft.com/office/drawing/2014/main" xmlns:p14="http://schemas.microsoft.com/office/powerpoint/2010/main" xmlns:a14="http://schemas.microsoft.com/office/drawing/2010/main" w="9525">
+                <a14:hiddenLine xmlns:a14="http://schemas.microsoft.com/office/drawing/2010/main" xmlns:p14="http://schemas.microsoft.com/office/powerpoint/2010/main" xmlns:a16="http://schemas.microsoft.com/office/drawing/2014/main" xmlns="" w="9525">
                   <a:solidFill>
                     <a:srgbClr val="000000"/>
                   </a:solidFill>
@@ -34560,7 +34534,7 @@
             </a:ln>
             <a:extLst>
               <a:ext uri="{91240B29-F687-4f45-9708-019B960494DF}">
-                <a14:hiddenLine xmlns="" xmlns:a16="http://schemas.microsoft.com/office/drawing/2014/main" xmlns:p14="http://schemas.microsoft.com/office/powerpoint/2010/main" xmlns:a14="http://schemas.microsoft.com/office/drawing/2010/main" w="9525">
+                <a14:hiddenLine xmlns:a14="http://schemas.microsoft.com/office/drawing/2010/main" xmlns:p14="http://schemas.microsoft.com/office/powerpoint/2010/main" xmlns:a16="http://schemas.microsoft.com/office/drawing/2014/main" xmlns="" w="9525">
                   <a:solidFill>
                     <a:srgbClr val="000000"/>
                   </a:solidFill>
@@ -34643,7 +34617,7 @@
             </a:ln>
             <a:extLst>
               <a:ext uri="{91240B29-F687-4f45-9708-019B960494DF}">
-                <a14:hiddenLine xmlns="" xmlns:a16="http://schemas.microsoft.com/office/drawing/2014/main" xmlns:p14="http://schemas.microsoft.com/office/powerpoint/2010/main" xmlns:a14="http://schemas.microsoft.com/office/drawing/2010/main" w="9525">
+                <a14:hiddenLine xmlns:a14="http://schemas.microsoft.com/office/drawing/2010/main" xmlns:p14="http://schemas.microsoft.com/office/powerpoint/2010/main" xmlns:a16="http://schemas.microsoft.com/office/drawing/2014/main" xmlns="" w="9525">
                   <a:solidFill>
                     <a:srgbClr val="000000"/>
                   </a:solidFill>
@@ -34748,7 +34722,7 @@
             </a:ln>
             <a:extLst>
               <a:ext uri="{91240B29-F687-4f45-9708-019B960494DF}">
-                <a14:hiddenLine xmlns="" xmlns:a16="http://schemas.microsoft.com/office/drawing/2014/main" xmlns:p14="http://schemas.microsoft.com/office/powerpoint/2010/main" xmlns:a14="http://schemas.microsoft.com/office/drawing/2010/main" w="9525">
+                <a14:hiddenLine xmlns:a14="http://schemas.microsoft.com/office/drawing/2010/main" xmlns:p14="http://schemas.microsoft.com/office/powerpoint/2010/main" xmlns:a16="http://schemas.microsoft.com/office/drawing/2014/main" xmlns="" w="9525">
                   <a:solidFill>
                     <a:srgbClr val="000000"/>
                   </a:solidFill>
@@ -34831,7 +34805,7 @@
             </a:ln>
             <a:extLst>
               <a:ext uri="{91240B29-F687-4f45-9708-019B960494DF}">
-                <a14:hiddenLine xmlns="" xmlns:a16="http://schemas.microsoft.com/office/drawing/2014/main" xmlns:p14="http://schemas.microsoft.com/office/powerpoint/2010/main" xmlns:a14="http://schemas.microsoft.com/office/drawing/2010/main" w="9525">
+                <a14:hiddenLine xmlns:a14="http://schemas.microsoft.com/office/drawing/2010/main" xmlns:p14="http://schemas.microsoft.com/office/powerpoint/2010/main" xmlns:a16="http://schemas.microsoft.com/office/drawing/2014/main" xmlns="" w="9525">
                   <a:solidFill>
                     <a:srgbClr val="000000"/>
                   </a:solidFill>
@@ -34936,7 +34910,7 @@
             </a:ln>
             <a:extLst>
               <a:ext uri="{91240B29-F687-4f45-9708-019B960494DF}">
-                <a14:hiddenLine xmlns="" xmlns:a16="http://schemas.microsoft.com/office/drawing/2014/main" xmlns:p14="http://schemas.microsoft.com/office/powerpoint/2010/main" xmlns:a14="http://schemas.microsoft.com/office/drawing/2010/main" w="9525">
+                <a14:hiddenLine xmlns:a14="http://schemas.microsoft.com/office/drawing/2010/main" xmlns:p14="http://schemas.microsoft.com/office/powerpoint/2010/main" xmlns:a16="http://schemas.microsoft.com/office/drawing/2014/main" xmlns="" w="9525">
                   <a:solidFill>
                     <a:srgbClr val="000000"/>
                   </a:solidFill>
@@ -34985,7 +34959,7 @@
             </a:ln>
             <a:extLst>
               <a:ext uri="{91240B29-F687-4f45-9708-019B960494DF}">
-                <a14:hiddenLine xmlns="" xmlns:a16="http://schemas.microsoft.com/office/drawing/2014/main" xmlns:p14="http://schemas.microsoft.com/office/powerpoint/2010/main" xmlns:a14="http://schemas.microsoft.com/office/drawing/2010/main" w="9525">
+                <a14:hiddenLine xmlns:a14="http://schemas.microsoft.com/office/drawing/2010/main" xmlns:p14="http://schemas.microsoft.com/office/powerpoint/2010/main" xmlns:a16="http://schemas.microsoft.com/office/drawing/2014/main" xmlns="" w="9525">
                   <a:solidFill>
                     <a:srgbClr val="000000"/>
                   </a:solidFill>
@@ -35090,7 +35064,7 @@
             </a:ln>
             <a:extLst>
               <a:ext uri="{91240B29-F687-4f45-9708-019B960494DF}">
-                <a14:hiddenLine xmlns="" xmlns:a16="http://schemas.microsoft.com/office/drawing/2014/main" xmlns:p14="http://schemas.microsoft.com/office/powerpoint/2010/main" xmlns:a14="http://schemas.microsoft.com/office/drawing/2010/main" w="9525">
+                <a14:hiddenLine xmlns:a14="http://schemas.microsoft.com/office/drawing/2010/main" xmlns:p14="http://schemas.microsoft.com/office/powerpoint/2010/main" xmlns:a16="http://schemas.microsoft.com/office/drawing/2014/main" xmlns="" w="9525">
                   <a:solidFill>
                     <a:srgbClr val="000000"/>
                   </a:solidFill>
@@ -35167,7 +35141,7 @@
             </a:ln>
             <a:extLst>
               <a:ext uri="{91240B29-F687-4f45-9708-019B960494DF}">
-                <a14:hiddenLine xmlns="" xmlns:a16="http://schemas.microsoft.com/office/drawing/2014/main" xmlns:p14="http://schemas.microsoft.com/office/powerpoint/2010/main" xmlns:a14="http://schemas.microsoft.com/office/drawing/2010/main" w="9525">
+                <a14:hiddenLine xmlns:a14="http://schemas.microsoft.com/office/drawing/2010/main" xmlns:p14="http://schemas.microsoft.com/office/powerpoint/2010/main" xmlns:a16="http://schemas.microsoft.com/office/drawing/2014/main" xmlns="" w="9525">
                   <a:solidFill>
                     <a:srgbClr val="000000"/>
                   </a:solidFill>
@@ -35244,7 +35218,7 @@
             </a:ln>
             <a:extLst>
               <a:ext uri="{91240B29-F687-4f45-9708-019B960494DF}">
-                <a14:hiddenLine xmlns="" xmlns:a16="http://schemas.microsoft.com/office/drawing/2014/main" xmlns:p14="http://schemas.microsoft.com/office/powerpoint/2010/main" xmlns:a14="http://schemas.microsoft.com/office/drawing/2010/main" w="9525">
+                <a14:hiddenLine xmlns:a14="http://schemas.microsoft.com/office/drawing/2010/main" xmlns:p14="http://schemas.microsoft.com/office/powerpoint/2010/main" xmlns:a16="http://schemas.microsoft.com/office/drawing/2014/main" xmlns="" w="9525">
                   <a:solidFill>
                     <a:srgbClr val="000000"/>
                   </a:solidFill>
@@ -35349,7 +35323,7 @@
             </a:ln>
             <a:extLst>
               <a:ext uri="{91240B29-F687-4f45-9708-019B960494DF}">
-                <a14:hiddenLine xmlns="" xmlns:a16="http://schemas.microsoft.com/office/drawing/2014/main" xmlns:p14="http://schemas.microsoft.com/office/powerpoint/2010/main" xmlns:a14="http://schemas.microsoft.com/office/drawing/2010/main" w="9525">
+                <a14:hiddenLine xmlns:a14="http://schemas.microsoft.com/office/drawing/2010/main" xmlns:p14="http://schemas.microsoft.com/office/powerpoint/2010/main" xmlns:a16="http://schemas.microsoft.com/office/drawing/2014/main" xmlns="" w="9525">
                   <a:solidFill>
                     <a:srgbClr val="000000"/>
                   </a:solidFill>
@@ -35432,7 +35406,7 @@
             </a:ln>
             <a:extLst>
               <a:ext uri="{91240B29-F687-4f45-9708-019B960494DF}">
-                <a14:hiddenLine xmlns="" xmlns:a16="http://schemas.microsoft.com/office/drawing/2014/main" xmlns:p14="http://schemas.microsoft.com/office/powerpoint/2010/main" xmlns:a14="http://schemas.microsoft.com/office/drawing/2010/main" w="9525">
+                <a14:hiddenLine xmlns:a14="http://schemas.microsoft.com/office/drawing/2010/main" xmlns:p14="http://schemas.microsoft.com/office/powerpoint/2010/main" xmlns:a16="http://schemas.microsoft.com/office/drawing/2014/main" xmlns="" w="9525">
                   <a:solidFill>
                     <a:srgbClr val="000000"/>
                   </a:solidFill>
@@ -35509,7 +35483,7 @@
             </a:ln>
             <a:extLst>
               <a:ext uri="{91240B29-F687-4f45-9708-019B960494DF}">
-                <a14:hiddenLine xmlns="" xmlns:a16="http://schemas.microsoft.com/office/drawing/2014/main" xmlns:p14="http://schemas.microsoft.com/office/powerpoint/2010/main" xmlns:a14="http://schemas.microsoft.com/office/drawing/2010/main" w="9525">
+                <a14:hiddenLine xmlns:a14="http://schemas.microsoft.com/office/drawing/2010/main" xmlns:p14="http://schemas.microsoft.com/office/powerpoint/2010/main" xmlns:a16="http://schemas.microsoft.com/office/drawing/2014/main" xmlns="" w="9525">
                   <a:solidFill>
                     <a:srgbClr val="000000"/>
                   </a:solidFill>
@@ -35614,7 +35588,7 @@
             </a:ln>
             <a:extLst>
               <a:ext uri="{91240B29-F687-4f45-9708-019B960494DF}">
-                <a14:hiddenLine xmlns="" xmlns:a16="http://schemas.microsoft.com/office/drawing/2014/main" xmlns:p14="http://schemas.microsoft.com/office/powerpoint/2010/main" xmlns:a14="http://schemas.microsoft.com/office/drawing/2010/main" w="9525">
+                <a14:hiddenLine xmlns:a14="http://schemas.microsoft.com/office/drawing/2010/main" xmlns:p14="http://schemas.microsoft.com/office/powerpoint/2010/main" xmlns:a16="http://schemas.microsoft.com/office/drawing/2014/main" xmlns="" w="9525">
                   <a:solidFill>
                     <a:srgbClr val="000000"/>
                   </a:solidFill>
@@ -35691,7 +35665,7 @@
             </a:ln>
             <a:extLst>
               <a:ext uri="{91240B29-F687-4f45-9708-019B960494DF}">
-                <a14:hiddenLine xmlns="" xmlns:a16="http://schemas.microsoft.com/office/drawing/2014/main" xmlns:p14="http://schemas.microsoft.com/office/powerpoint/2010/main" xmlns:a14="http://schemas.microsoft.com/office/drawing/2010/main" w="9525">
+                <a14:hiddenLine xmlns:a14="http://schemas.microsoft.com/office/drawing/2010/main" xmlns:p14="http://schemas.microsoft.com/office/powerpoint/2010/main" xmlns:a16="http://schemas.microsoft.com/office/drawing/2014/main" xmlns="" w="9525">
                   <a:solidFill>
                     <a:srgbClr val="000000"/>
                   </a:solidFill>
@@ -35796,7 +35770,7 @@
             </a:ln>
             <a:extLst>
               <a:ext uri="{91240B29-F687-4f45-9708-019B960494DF}">
-                <a14:hiddenLine xmlns="" xmlns:a16="http://schemas.microsoft.com/office/drawing/2014/main" xmlns:p14="http://schemas.microsoft.com/office/powerpoint/2010/main" xmlns:a14="http://schemas.microsoft.com/office/drawing/2010/main" w="9525">
+                <a14:hiddenLine xmlns:a14="http://schemas.microsoft.com/office/drawing/2010/main" xmlns:p14="http://schemas.microsoft.com/office/powerpoint/2010/main" xmlns:a16="http://schemas.microsoft.com/office/drawing/2014/main" xmlns="" w="9525">
                   <a:solidFill>
                     <a:srgbClr val="000000"/>
                   </a:solidFill>
@@ -35873,7 +35847,7 @@
             </a:ln>
             <a:extLst>
               <a:ext uri="{91240B29-F687-4f45-9708-019B960494DF}">
-                <a14:hiddenLine xmlns="" xmlns:a16="http://schemas.microsoft.com/office/drawing/2014/main" xmlns:p14="http://schemas.microsoft.com/office/powerpoint/2010/main" xmlns:a14="http://schemas.microsoft.com/office/drawing/2010/main" w="9525">
+                <a14:hiddenLine xmlns:a14="http://schemas.microsoft.com/office/drawing/2010/main" xmlns:p14="http://schemas.microsoft.com/office/powerpoint/2010/main" xmlns:a16="http://schemas.microsoft.com/office/drawing/2014/main" xmlns="" w="9525">
                   <a:solidFill>
                     <a:srgbClr val="000000"/>
                   </a:solidFill>
@@ -35978,7 +35952,7 @@
             </a:ln>
             <a:extLst>
               <a:ext uri="{91240B29-F687-4f45-9708-019B960494DF}">
-                <a14:hiddenLine xmlns="" xmlns:a16="http://schemas.microsoft.com/office/drawing/2014/main" xmlns:p14="http://schemas.microsoft.com/office/powerpoint/2010/main" xmlns:a14="http://schemas.microsoft.com/office/drawing/2010/main" w="9525">
+                <a14:hiddenLine xmlns:a14="http://schemas.microsoft.com/office/drawing/2010/main" xmlns:p14="http://schemas.microsoft.com/office/powerpoint/2010/main" xmlns:a16="http://schemas.microsoft.com/office/drawing/2014/main" xmlns="" w="9525">
                   <a:solidFill>
                     <a:srgbClr val="000000"/>
                   </a:solidFill>
@@ -36027,7 +36001,7 @@
             </a:ln>
             <a:extLst>
               <a:ext uri="{91240B29-F687-4f45-9708-019B960494DF}">
-                <a14:hiddenLine xmlns="" xmlns:a16="http://schemas.microsoft.com/office/drawing/2014/main" xmlns:p14="http://schemas.microsoft.com/office/powerpoint/2010/main" xmlns:a14="http://schemas.microsoft.com/office/drawing/2010/main" w="9525">
+                <a14:hiddenLine xmlns:a14="http://schemas.microsoft.com/office/drawing/2010/main" xmlns:p14="http://schemas.microsoft.com/office/powerpoint/2010/main" xmlns:a16="http://schemas.microsoft.com/office/drawing/2014/main" xmlns="" w="9525">
                   <a:solidFill>
                     <a:srgbClr val="000000"/>
                   </a:solidFill>
@@ -36107,7 +36081,7 @@
             </a:ln>
             <a:extLst>
               <a:ext uri="{91240B29-F687-4f45-9708-019B960494DF}">
-                <a14:hiddenLine xmlns="" xmlns:a16="http://schemas.microsoft.com/office/drawing/2014/main" xmlns:p14="http://schemas.microsoft.com/office/powerpoint/2010/main" xmlns:a14="http://schemas.microsoft.com/office/drawing/2010/main" w="9525">
+                <a14:hiddenLine xmlns:a14="http://schemas.microsoft.com/office/drawing/2010/main" xmlns:p14="http://schemas.microsoft.com/office/powerpoint/2010/main" xmlns:a16="http://schemas.microsoft.com/office/drawing/2014/main" xmlns="" w="9525">
                   <a:solidFill>
                     <a:srgbClr val="000000"/>
                   </a:solidFill>
@@ -36212,7 +36186,7 @@
             </a:ln>
             <a:extLst>
               <a:ext uri="{91240B29-F687-4f45-9708-019B960494DF}">
-                <a14:hiddenLine xmlns="" xmlns:a16="http://schemas.microsoft.com/office/drawing/2014/main" xmlns:p14="http://schemas.microsoft.com/office/powerpoint/2010/main" xmlns:a14="http://schemas.microsoft.com/office/drawing/2010/main" w="9525">
+                <a14:hiddenLine xmlns:a14="http://schemas.microsoft.com/office/drawing/2010/main" xmlns:p14="http://schemas.microsoft.com/office/powerpoint/2010/main" xmlns:a16="http://schemas.microsoft.com/office/drawing/2014/main" xmlns="" w="9525">
                   <a:solidFill>
                     <a:srgbClr val="000000"/>
                   </a:solidFill>
@@ -36289,7 +36263,7 @@
             </a:ln>
             <a:extLst>
               <a:ext uri="{91240B29-F687-4f45-9708-019B960494DF}">
-                <a14:hiddenLine xmlns="" xmlns:a16="http://schemas.microsoft.com/office/drawing/2014/main" xmlns:p14="http://schemas.microsoft.com/office/powerpoint/2010/main" xmlns:a14="http://schemas.microsoft.com/office/drawing/2010/main" w="9525">
+                <a14:hiddenLine xmlns:a14="http://schemas.microsoft.com/office/drawing/2010/main" xmlns:p14="http://schemas.microsoft.com/office/powerpoint/2010/main" xmlns:a16="http://schemas.microsoft.com/office/drawing/2014/main" xmlns="" w="9525">
                   <a:solidFill>
                     <a:srgbClr val="000000"/>
                   </a:solidFill>
@@ -36394,7 +36368,7 @@
             </a:ln>
             <a:extLst>
               <a:ext uri="{91240B29-F687-4f45-9708-019B960494DF}">
-                <a14:hiddenLine xmlns="" xmlns:a16="http://schemas.microsoft.com/office/drawing/2014/main" xmlns:p14="http://schemas.microsoft.com/office/powerpoint/2010/main" xmlns:a14="http://schemas.microsoft.com/office/drawing/2010/main" w="9525">
+                <a14:hiddenLine xmlns:a14="http://schemas.microsoft.com/office/drawing/2010/main" xmlns:p14="http://schemas.microsoft.com/office/powerpoint/2010/main" xmlns:a16="http://schemas.microsoft.com/office/drawing/2014/main" xmlns="" w="9525">
                   <a:solidFill>
                     <a:srgbClr val="000000"/>
                   </a:solidFill>
@@ -36499,7 +36473,7 @@
             </a:ln>
             <a:extLst>
               <a:ext uri="{91240B29-F687-4f45-9708-019B960494DF}">
-                <a14:hiddenLine xmlns="" xmlns:a16="http://schemas.microsoft.com/office/drawing/2014/main" xmlns:p14="http://schemas.microsoft.com/office/powerpoint/2010/main" xmlns:a14="http://schemas.microsoft.com/office/drawing/2010/main" w="9525">
+                <a14:hiddenLine xmlns:a14="http://schemas.microsoft.com/office/drawing/2010/main" xmlns:p14="http://schemas.microsoft.com/office/powerpoint/2010/main" xmlns:a16="http://schemas.microsoft.com/office/drawing/2014/main" xmlns="" w="9525">
                   <a:solidFill>
                     <a:srgbClr val="000000"/>
                   </a:solidFill>
@@ -36579,7 +36553,7 @@
             </a:ln>
             <a:extLst>
               <a:ext uri="{91240B29-F687-4f45-9708-019B960494DF}">
-                <a14:hiddenLine xmlns="" xmlns:a16="http://schemas.microsoft.com/office/drawing/2014/main" xmlns:p14="http://schemas.microsoft.com/office/powerpoint/2010/main" xmlns:a14="http://schemas.microsoft.com/office/drawing/2010/main" w="9525">
+                <a14:hiddenLine xmlns:a14="http://schemas.microsoft.com/office/drawing/2010/main" xmlns:p14="http://schemas.microsoft.com/office/powerpoint/2010/main" xmlns:a16="http://schemas.microsoft.com/office/drawing/2014/main" xmlns="" w="9525">
                   <a:solidFill>
                     <a:srgbClr val="000000"/>
                   </a:solidFill>
@@ -36656,7 +36630,7 @@
             </a:ln>
             <a:extLst>
               <a:ext uri="{91240B29-F687-4f45-9708-019B960494DF}">
-                <a14:hiddenLine xmlns="" xmlns:a16="http://schemas.microsoft.com/office/drawing/2014/main" xmlns:p14="http://schemas.microsoft.com/office/powerpoint/2010/main" xmlns:a14="http://schemas.microsoft.com/office/drawing/2010/main" w="9525">
+                <a14:hiddenLine xmlns:a14="http://schemas.microsoft.com/office/drawing/2010/main" xmlns:p14="http://schemas.microsoft.com/office/powerpoint/2010/main" xmlns:a16="http://schemas.microsoft.com/office/drawing/2014/main" xmlns="" w="9525">
                   <a:solidFill>
                     <a:srgbClr val="000000"/>
                   </a:solidFill>
@@ -36761,7 +36735,7 @@
             </a:ln>
             <a:extLst>
               <a:ext uri="{91240B29-F687-4f45-9708-019B960494DF}">
-                <a14:hiddenLine xmlns="" xmlns:a16="http://schemas.microsoft.com/office/drawing/2014/main" xmlns:p14="http://schemas.microsoft.com/office/powerpoint/2010/main" xmlns:a14="http://schemas.microsoft.com/office/drawing/2010/main" w="9525">
+                <a14:hiddenLine xmlns:a14="http://schemas.microsoft.com/office/drawing/2010/main" xmlns:p14="http://schemas.microsoft.com/office/powerpoint/2010/main" xmlns:a16="http://schemas.microsoft.com/office/drawing/2014/main" xmlns="" w="9525">
                   <a:solidFill>
                     <a:srgbClr val="000000"/>
                   </a:solidFill>
@@ -36866,7 +36840,7 @@
             </a:ln>
             <a:extLst>
               <a:ext uri="{91240B29-F687-4f45-9708-019B960494DF}">
-                <a14:hiddenLine xmlns="" xmlns:a16="http://schemas.microsoft.com/office/drawing/2014/main" xmlns:p14="http://schemas.microsoft.com/office/powerpoint/2010/main" xmlns:a14="http://schemas.microsoft.com/office/drawing/2010/main" w="9525">
+                <a14:hiddenLine xmlns:a14="http://schemas.microsoft.com/office/drawing/2010/main" xmlns:p14="http://schemas.microsoft.com/office/powerpoint/2010/main" xmlns:a16="http://schemas.microsoft.com/office/drawing/2014/main" xmlns="" w="9525">
                   <a:solidFill>
                     <a:srgbClr val="000000"/>
                   </a:solidFill>
@@ -36943,7 +36917,7 @@
             </a:ln>
             <a:extLst>
               <a:ext uri="{91240B29-F687-4f45-9708-019B960494DF}">
-                <a14:hiddenLine xmlns="" xmlns:a16="http://schemas.microsoft.com/office/drawing/2014/main" xmlns:p14="http://schemas.microsoft.com/office/powerpoint/2010/main" xmlns:a14="http://schemas.microsoft.com/office/drawing/2010/main" w="9525">
+                <a14:hiddenLine xmlns:a14="http://schemas.microsoft.com/office/drawing/2010/main" xmlns:p14="http://schemas.microsoft.com/office/powerpoint/2010/main" xmlns:a16="http://schemas.microsoft.com/office/drawing/2014/main" xmlns="" w="9525">
                   <a:solidFill>
                     <a:srgbClr val="000000"/>
                   </a:solidFill>
@@ -37078,7 +37052,7 @@
             </a:ln>
             <a:extLst>
               <a:ext uri="{91240B29-F687-4f45-9708-019B960494DF}">
-                <a14:hiddenLine xmlns="" xmlns:a16="http://schemas.microsoft.com/office/drawing/2014/main" xmlns:p14="http://schemas.microsoft.com/office/powerpoint/2010/main" xmlns:a14="http://schemas.microsoft.com/office/drawing/2010/main" w="9525">
+                <a14:hiddenLine xmlns:a14="http://schemas.microsoft.com/office/drawing/2010/main" xmlns:p14="http://schemas.microsoft.com/office/powerpoint/2010/main" xmlns:a16="http://schemas.microsoft.com/office/drawing/2014/main" xmlns="" w="9525">
                   <a:solidFill>
                     <a:srgbClr val="000000"/>
                   </a:solidFill>
@@ -37161,7 +37135,7 @@
             </a:ln>
             <a:extLst>
               <a:ext uri="{91240B29-F687-4f45-9708-019B960494DF}">
-                <a14:hiddenLine xmlns="" xmlns:a16="http://schemas.microsoft.com/office/drawing/2014/main" xmlns:p14="http://schemas.microsoft.com/office/powerpoint/2010/main" xmlns:a14="http://schemas.microsoft.com/office/drawing/2010/main" w="9525">
+                <a14:hiddenLine xmlns:a14="http://schemas.microsoft.com/office/drawing/2010/main" xmlns:p14="http://schemas.microsoft.com/office/powerpoint/2010/main" xmlns:a16="http://schemas.microsoft.com/office/drawing/2014/main" xmlns="" w="9525">
                   <a:solidFill>
                     <a:srgbClr val="000000"/>
                   </a:solidFill>
@@ -37266,7 +37240,7 @@
             </a:ln>
             <a:extLst>
               <a:ext uri="{91240B29-F687-4f45-9708-019B960494DF}">
-                <a14:hiddenLine xmlns="" xmlns:a16="http://schemas.microsoft.com/office/drawing/2014/main" xmlns:p14="http://schemas.microsoft.com/office/powerpoint/2010/main" xmlns:a14="http://schemas.microsoft.com/office/drawing/2010/main" w="9525">
+                <a14:hiddenLine xmlns:a14="http://schemas.microsoft.com/office/drawing/2010/main" xmlns:p14="http://schemas.microsoft.com/office/powerpoint/2010/main" xmlns:a16="http://schemas.microsoft.com/office/drawing/2014/main" xmlns="" w="9525">
                   <a:solidFill>
                     <a:srgbClr val="000000"/>
                   </a:solidFill>

</xml_diff>